<commit_message>
Modified ppt for EDA
Modified ppt for EDA
</commit_message>
<xml_diff>
--- a/sample/1_data_handling.pptx
+++ b/sample/1_data_handling.pptx
@@ -219,7 +219,7 @@
           <a:p>
             <a:fld id="{2A71EC23-F9ED-424C-B5FB-B7B5F6D78B70}" type="datetimeFigureOut">
               <a:rPr kumimoji="1" lang="ja-JP" altLang="en-US" smtClean="0"/>
-              <a:t>2020/10/1</a:t>
+              <a:t>2020/10/5</a:t>
             </a:fld>
             <a:endParaRPr kumimoji="1" lang="ja-JP" altLang="en-US"/>
           </a:p>
@@ -738,7 +738,7 @@
           <a:p>
             <a:fld id="{0F81A95D-05BA-458D-BB44-152E4BC8CA84}" type="datetime1">
               <a:rPr kumimoji="1" lang="ja-JP" altLang="en-US" smtClean="0"/>
-              <a:t>2020/10/1</a:t>
+              <a:t>2020/10/5</a:t>
             </a:fld>
             <a:endParaRPr kumimoji="1" lang="ja-JP" altLang="en-US"/>
           </a:p>
@@ -960,7 +960,7 @@
           <a:p>
             <a:fld id="{9906A6E4-4266-427F-9354-B8DA436806C3}" type="datetime1">
               <a:rPr kumimoji="1" lang="ja-JP" altLang="en-US" smtClean="0"/>
-              <a:t>2020/10/1</a:t>
+              <a:t>2020/10/5</a:t>
             </a:fld>
             <a:endParaRPr kumimoji="1" lang="ja-JP" altLang="en-US"/>
           </a:p>
@@ -1176,7 +1176,7 @@
           <a:p>
             <a:fld id="{362664A4-23FB-43CF-818D-F7393D757BD2}" type="datetime1">
               <a:rPr kumimoji="1" lang="ja-JP" altLang="en-US" smtClean="0"/>
-              <a:t>2020/10/1</a:t>
+              <a:t>2020/10/5</a:t>
             </a:fld>
             <a:endParaRPr kumimoji="1" lang="ja-JP" altLang="en-US"/>
           </a:p>
@@ -1382,7 +1382,7 @@
           <a:p>
             <a:fld id="{BFE15652-DDD4-4E36-9CB3-8E9EF446BEDB}" type="datetime1">
               <a:rPr kumimoji="1" lang="ja-JP" altLang="en-US" smtClean="0"/>
-              <a:t>2020/10/1</a:t>
+              <a:t>2020/10/5</a:t>
             </a:fld>
             <a:endParaRPr kumimoji="1" lang="ja-JP" altLang="en-US"/>
           </a:p>
@@ -1653,7 +1653,7 @@
           <a:p>
             <a:fld id="{30BAF585-2E3D-431A-AD29-AD87965751CC}" type="datetime1">
               <a:rPr kumimoji="1" lang="ja-JP" altLang="en-US" smtClean="0"/>
-              <a:t>2020/10/1</a:t>
+              <a:t>2020/10/5</a:t>
             </a:fld>
             <a:endParaRPr kumimoji="1" lang="ja-JP" altLang="en-US"/>
           </a:p>
@@ -1969,7 +1969,7 @@
           <a:p>
             <a:fld id="{0A1D67E2-B520-4BB6-8434-DE7E995735B8}" type="datetime1">
               <a:rPr kumimoji="1" lang="ja-JP" altLang="en-US" smtClean="0"/>
-              <a:t>2020/10/1</a:t>
+              <a:t>2020/10/5</a:t>
             </a:fld>
             <a:endParaRPr kumimoji="1" lang="ja-JP" altLang="en-US"/>
           </a:p>
@@ -2420,7 +2420,7 @@
           <a:p>
             <a:fld id="{500F9857-EF08-440C-94CB-83D9EE0D5A5A}" type="datetime1">
               <a:rPr kumimoji="1" lang="ja-JP" altLang="en-US" smtClean="0"/>
-              <a:t>2020/10/1</a:t>
+              <a:t>2020/10/5</a:t>
             </a:fld>
             <a:endParaRPr kumimoji="1" lang="ja-JP" altLang="en-US"/>
           </a:p>
@@ -2558,7 +2558,7 @@
           <a:p>
             <a:fld id="{B6BF44F8-E47A-4CCA-94C1-5A88DC7B414A}" type="datetime1">
               <a:rPr kumimoji="1" lang="ja-JP" altLang="en-US" smtClean="0"/>
-              <a:t>2020/10/1</a:t>
+              <a:t>2020/10/5</a:t>
             </a:fld>
             <a:endParaRPr kumimoji="1" lang="ja-JP" altLang="en-US"/>
           </a:p>
@@ -2673,7 +2673,7 @@
           <a:p>
             <a:fld id="{DE263015-59FD-444D-A49B-45D0DD94C4F1}" type="datetime1">
               <a:rPr kumimoji="1" lang="ja-JP" altLang="en-US" smtClean="0"/>
-              <a:t>2020/10/1</a:t>
+              <a:t>2020/10/5</a:t>
             </a:fld>
             <a:endParaRPr kumimoji="1" lang="ja-JP" altLang="en-US"/>
           </a:p>
@@ -3002,7 +3002,7 @@
           <a:p>
             <a:fld id="{7A6651C1-F643-424E-9D81-62CF9A82FABB}" type="datetime1">
               <a:rPr kumimoji="1" lang="ja-JP" altLang="en-US" smtClean="0"/>
-              <a:t>2020/10/1</a:t>
+              <a:t>2020/10/5</a:t>
             </a:fld>
             <a:endParaRPr kumimoji="1" lang="ja-JP" altLang="en-US"/>
           </a:p>
@@ -3263,7 +3263,7 @@
           <a:p>
             <a:fld id="{E79AACC8-2A3E-4AB1-936D-2A445495DFBA}" type="datetime1">
               <a:rPr kumimoji="1" lang="ja-JP" altLang="en-US" smtClean="0"/>
-              <a:t>2020/10/1</a:t>
+              <a:t>2020/10/5</a:t>
             </a:fld>
             <a:endParaRPr kumimoji="1" lang="ja-JP" altLang="en-US"/>
           </a:p>
@@ -3512,7 +3512,7 @@
           <a:p>
             <a:fld id="{79B7E619-0862-4EB5-B675-91B651E48568}" type="datetime1">
               <a:rPr kumimoji="1" lang="ja-JP" altLang="en-US" smtClean="0"/>
-              <a:t>2020/10/1</a:t>
+              <a:t>2020/10/5</a:t>
             </a:fld>
             <a:endParaRPr kumimoji="1" lang="ja-JP" altLang="en-US"/>
           </a:p>
@@ -4434,14 +4434,14 @@
               <a:t>## Number of MK7655 </a:t>
             </a:r>
             <a:r>
-              <a:rPr lang="en-US" altLang="ja-JP" sz="1600" dirty="0" err="1">
+              <a:rPr lang="en-US" altLang="ja-JP" sz="1600" dirty="0" smtClean="0">
                 <a:solidFill>
                   <a:schemeClr val="accent6">
                     <a:lumMod val="75000"/>
                   </a:schemeClr>
                 </a:solidFill>
               </a:rPr>
-              <a:t>Vaid</a:t>
+              <a:t>Valid </a:t>
             </a:r>
             <a:r>
               <a:rPr lang="en-US" altLang="ja-JP" sz="1600" dirty="0">
@@ -4451,7 +4451,7 @@
                   </a:schemeClr>
                 </a:solidFill>
               </a:rPr>
-              <a:t> Concentration Record by PN</a:t>
+              <a:t>Concentration Record by PN</a:t>
             </a:r>
           </a:p>
           <a:p>
@@ -4483,14 +4483,14 @@
               <a:t>## Number of Subject and MK7655 </a:t>
             </a:r>
             <a:r>
-              <a:rPr lang="en-US" altLang="ja-JP" sz="1600" dirty="0" err="1">
+              <a:rPr lang="en-US" altLang="ja-JP" sz="1600" dirty="0" smtClean="0">
                 <a:solidFill>
                   <a:schemeClr val="accent6">
                     <a:lumMod val="75000"/>
                   </a:schemeClr>
                 </a:solidFill>
               </a:rPr>
-              <a:t>Vaid</a:t>
+              <a:t>Valid </a:t>
             </a:r>
             <a:r>
               <a:rPr lang="en-US" altLang="ja-JP" sz="1600" dirty="0">
@@ -4500,7 +4500,7 @@
                   </a:schemeClr>
                 </a:solidFill>
               </a:rPr>
-              <a:t> Concentration Record by PN</a:t>
+              <a:t>Concentration Record by PN</a:t>
             </a:r>
           </a:p>
           <a:p>
@@ -4881,11 +4881,7 @@
             </a:r>
             <a:r>
               <a:rPr kumimoji="1" lang="ja-JP" altLang="en-US" sz="1600" dirty="0" smtClean="0"/>
-              <a:t>で結合のため</a:t>
-            </a:r>
-            <a:r>
-              <a:rPr kumimoji="1" lang="ja-JP" altLang="en-US" sz="1600" dirty="0" smtClean="0"/>
-              <a:t>の</a:t>
+              <a:t>で結合のための</a:t>
             </a:r>
             <a:r>
               <a:rPr kumimoji="1" lang="en-US" altLang="ja-JP" sz="1600" dirty="0" smtClean="0"/>
@@ -4913,11 +4909,7 @@
             </a:r>
             <a:r>
               <a:rPr lang="ja-JP" altLang="en-US" sz="1600" dirty="0" smtClean="0"/>
-              <a:t>に</a:t>
-            </a:r>
-            <a:r>
-              <a:rPr lang="ja-JP" altLang="en-US" sz="1600" dirty="0" smtClean="0"/>
-              <a:t>も</a:t>
+              <a:t>にも</a:t>
             </a:r>
             <a:r>
               <a:rPr lang="ja-JP" altLang="en-US" sz="1600" dirty="0"/>
@@ -4993,11 +4985,7 @@
             </a:r>
             <a:r>
               <a:rPr lang="ja-JP" altLang="en-US" sz="1600" dirty="0" smtClean="0"/>
-              <a:t>と</a:t>
-            </a:r>
-            <a:r>
-              <a:rPr lang="ja-JP" altLang="en-US" sz="1600" dirty="0" smtClean="0"/>
-              <a:t>いうものもある</a:t>
+              <a:t>というものもある</a:t>
             </a:r>
             <a:endParaRPr kumimoji="1" lang="en-US" altLang="ja-JP" sz="1600" dirty="0" smtClean="0"/>
           </a:p>
@@ -5039,11 +5027,7 @@
             </a:r>
             <a:r>
               <a:rPr lang="en-US" altLang="ja-JP" sz="1200" dirty="0" smtClean="0"/>
-              <a:t>, </a:t>
-            </a:r>
-            <a:r>
-              <a:rPr lang="en-US" altLang="ja-JP" sz="1200" dirty="0" smtClean="0"/>
-              <a:t>by=</a:t>
+              <a:t>, by=</a:t>
             </a:r>
             <a:r>
               <a:rPr lang="en-US" altLang="ja-JP" sz="1200" dirty="0" smtClean="0">
@@ -5217,11 +5201,7 @@
             </a:r>
             <a:r>
               <a:rPr lang="ja-JP" altLang="en-US" sz="2000" dirty="0" smtClean="0"/>
-              <a:t>データの下側から別のデータを結合</a:t>
-            </a:r>
-            <a:r>
-              <a:rPr lang="ja-JP" altLang="en-US" sz="2000" dirty="0" smtClean="0"/>
-              <a:t>する</a:t>
+              <a:t>データの下側から別のデータを結合する</a:t>
             </a:r>
             <a:endParaRPr lang="en-US" altLang="ja-JP" sz="2000" dirty="0" smtClean="0"/>
           </a:p>
@@ -5361,11 +5341,7 @@
             </a:r>
             <a:r>
               <a:rPr kumimoji="1" lang="ja-JP" altLang="en-US" sz="2000" dirty="0" smtClean="0"/>
-              <a:t>で指定した</a:t>
-            </a:r>
-            <a:r>
-              <a:rPr kumimoji="1" lang="ja-JP" altLang="en-US" sz="2000" dirty="0" smtClean="0"/>
-              <a:t>列の昇順に並び替える</a:t>
+              <a:t>で指定した列の昇順に並び替える</a:t>
             </a:r>
             <a:endParaRPr kumimoji="1" lang="en-US" altLang="ja-JP" sz="2000" dirty="0" smtClean="0"/>
           </a:p>
@@ -5391,7 +5367,6 @@
               <a:rPr kumimoji="1" lang="en-US" altLang="ja-JP" sz="1600" dirty="0" smtClean="0"/>
               <a:t>()</a:t>
             </a:r>
-            <a:endParaRPr kumimoji="1" lang="en-US" altLang="ja-JP" sz="1600" dirty="0" smtClean="0"/>
           </a:p>
           <a:p>
             <a:pPr marL="457200" lvl="1" indent="0">
@@ -7209,11 +7184,6 @@
               </a:rPr>
               <a:t>(MDV))</a:t>
             </a:r>
-            <a:endParaRPr lang="en-US" altLang="ja-JP" sz="1000" dirty="0">
-              <a:solidFill>
-                <a:schemeClr val="tx1"/>
-              </a:solidFill>
-            </a:endParaRPr>
           </a:p>
         </p:txBody>
       </p:sp>
@@ -7573,9 +7543,749 @@
   <p:timing>
     <p:tnLst>
       <p:par>
-        <p:cTn id="1" dur="indefinite" restart="never" nodeType="tmRoot"/>
+        <p:cTn id="1" dur="indefinite" restart="never" nodeType="tmRoot">
+          <p:childTnLst>
+            <p:seq concurrent="1" nextAc="seek">
+              <p:cTn id="2" dur="indefinite" nodeType="mainSeq">
+                <p:childTnLst>
+                  <p:par>
+                    <p:cTn id="3" fill="hold">
+                      <p:stCondLst>
+                        <p:cond delay="indefinite"/>
+                      </p:stCondLst>
+                      <p:childTnLst>
+                        <p:par>
+                          <p:cTn id="4" fill="hold">
+                            <p:stCondLst>
+                              <p:cond delay="0"/>
+                            </p:stCondLst>
+                            <p:childTnLst>
+                              <p:par>
+                                <p:cTn id="5" presetID="1" presetClass="entr" presetSubtype="0" fill="hold" nodeType="clickEffect">
+                                  <p:stCondLst>
+                                    <p:cond delay="0"/>
+                                  </p:stCondLst>
+                                  <p:childTnLst>
+                                    <p:set>
+                                      <p:cBhvr>
+                                        <p:cTn id="6" dur="1" fill="hold">
+                                          <p:stCondLst>
+                                            <p:cond delay="0"/>
+                                          </p:stCondLst>
+                                        </p:cTn>
+                                        <p:tgtEl>
+                                          <p:spTgt spid="9"/>
+                                        </p:tgtEl>
+                                        <p:attrNameLst>
+                                          <p:attrName>style.visibility</p:attrName>
+                                        </p:attrNameLst>
+                                      </p:cBhvr>
+                                      <p:to>
+                                        <p:strVal val="visible"/>
+                                      </p:to>
+                                    </p:set>
+                                  </p:childTnLst>
+                                </p:cTn>
+                              </p:par>
+                              <p:par>
+                                <p:cTn id="7" presetID="1" presetClass="entr" presetSubtype="0" fill="hold" nodeType="withEffect">
+                                  <p:stCondLst>
+                                    <p:cond delay="0"/>
+                                  </p:stCondLst>
+                                  <p:childTnLst>
+                                    <p:set>
+                                      <p:cBhvr>
+                                        <p:cTn id="8" dur="1" fill="hold">
+                                          <p:stCondLst>
+                                            <p:cond delay="0"/>
+                                          </p:stCondLst>
+                                        </p:cTn>
+                                        <p:tgtEl>
+                                          <p:spTgt spid="15"/>
+                                        </p:tgtEl>
+                                        <p:attrNameLst>
+                                          <p:attrName>style.visibility</p:attrName>
+                                        </p:attrNameLst>
+                                      </p:cBhvr>
+                                      <p:to>
+                                        <p:strVal val="visible"/>
+                                      </p:to>
+                                    </p:set>
+                                  </p:childTnLst>
+                                </p:cTn>
+                              </p:par>
+                              <p:par>
+                                <p:cTn id="9" presetID="1" presetClass="entr" presetSubtype="0" fill="hold" grpId="0" nodeType="withEffect">
+                                  <p:stCondLst>
+                                    <p:cond delay="0"/>
+                                  </p:stCondLst>
+                                  <p:childTnLst>
+                                    <p:set>
+                                      <p:cBhvr>
+                                        <p:cTn id="10" dur="1" fill="hold">
+                                          <p:stCondLst>
+                                            <p:cond delay="0"/>
+                                          </p:stCondLst>
+                                        </p:cTn>
+                                        <p:tgtEl>
+                                          <p:spTgt spid="10"/>
+                                        </p:tgtEl>
+                                        <p:attrNameLst>
+                                          <p:attrName>style.visibility</p:attrName>
+                                        </p:attrNameLst>
+                                      </p:cBhvr>
+                                      <p:to>
+                                        <p:strVal val="visible"/>
+                                      </p:to>
+                                    </p:set>
+                                  </p:childTnLst>
+                                </p:cTn>
+                              </p:par>
+                              <p:par>
+                                <p:cTn id="11" presetID="1" presetClass="entr" presetSubtype="0" fill="hold" nodeType="withEffect">
+                                  <p:stCondLst>
+                                    <p:cond delay="0"/>
+                                  </p:stCondLst>
+                                  <p:childTnLst>
+                                    <p:set>
+                                      <p:cBhvr>
+                                        <p:cTn id="12" dur="1" fill="hold">
+                                          <p:stCondLst>
+                                            <p:cond delay="0"/>
+                                          </p:stCondLst>
+                                        </p:cTn>
+                                        <p:tgtEl>
+                                          <p:spTgt spid="16"/>
+                                        </p:tgtEl>
+                                        <p:attrNameLst>
+                                          <p:attrName>style.visibility</p:attrName>
+                                        </p:attrNameLst>
+                                      </p:cBhvr>
+                                      <p:to>
+                                        <p:strVal val="visible"/>
+                                      </p:to>
+                                    </p:set>
+                                  </p:childTnLst>
+                                </p:cTn>
+                              </p:par>
+                            </p:childTnLst>
+                          </p:cTn>
+                        </p:par>
+                      </p:childTnLst>
+                    </p:cTn>
+                  </p:par>
+                  <p:par>
+                    <p:cTn id="13" fill="hold">
+                      <p:stCondLst>
+                        <p:cond delay="indefinite"/>
+                      </p:stCondLst>
+                      <p:childTnLst>
+                        <p:par>
+                          <p:cTn id="14" fill="hold">
+                            <p:stCondLst>
+                              <p:cond delay="0"/>
+                            </p:stCondLst>
+                            <p:childTnLst>
+                              <p:par>
+                                <p:cTn id="15" presetID="1" presetClass="entr" presetSubtype="0" fill="hold" nodeType="clickEffect">
+                                  <p:stCondLst>
+                                    <p:cond delay="0"/>
+                                  </p:stCondLst>
+                                  <p:childTnLst>
+                                    <p:set>
+                                      <p:cBhvr>
+                                        <p:cTn id="16" dur="1" fill="hold">
+                                          <p:stCondLst>
+                                            <p:cond delay="0"/>
+                                          </p:stCondLst>
+                                        </p:cTn>
+                                        <p:tgtEl>
+                                          <p:spTgt spid="3">
+                                            <p:txEl>
+                                              <p:pRg st="7" end="7"/>
+                                            </p:txEl>
+                                          </p:spTgt>
+                                        </p:tgtEl>
+                                        <p:attrNameLst>
+                                          <p:attrName>style.visibility</p:attrName>
+                                        </p:attrNameLst>
+                                      </p:cBhvr>
+                                      <p:to>
+                                        <p:strVal val="visible"/>
+                                      </p:to>
+                                    </p:set>
+                                  </p:childTnLst>
+                                </p:cTn>
+                              </p:par>
+                              <p:par>
+                                <p:cTn id="17" presetID="1" presetClass="entr" presetSubtype="0" fill="hold" nodeType="withEffect">
+                                  <p:stCondLst>
+                                    <p:cond delay="0"/>
+                                  </p:stCondLst>
+                                  <p:childTnLst>
+                                    <p:set>
+                                      <p:cBhvr>
+                                        <p:cTn id="18" dur="1" fill="hold">
+                                          <p:stCondLst>
+                                            <p:cond delay="0"/>
+                                          </p:stCondLst>
+                                        </p:cTn>
+                                        <p:tgtEl>
+                                          <p:spTgt spid="3">
+                                            <p:txEl>
+                                              <p:pRg st="8" end="8"/>
+                                            </p:txEl>
+                                          </p:spTgt>
+                                        </p:tgtEl>
+                                        <p:attrNameLst>
+                                          <p:attrName>style.visibility</p:attrName>
+                                        </p:attrNameLst>
+                                      </p:cBhvr>
+                                      <p:to>
+                                        <p:strVal val="visible"/>
+                                      </p:to>
+                                    </p:set>
+                                  </p:childTnLst>
+                                </p:cTn>
+                              </p:par>
+                              <p:par>
+                                <p:cTn id="19" presetID="1" presetClass="entr" presetSubtype="0" fill="hold" nodeType="withEffect">
+                                  <p:stCondLst>
+                                    <p:cond delay="0"/>
+                                  </p:stCondLst>
+                                  <p:childTnLst>
+                                    <p:set>
+                                      <p:cBhvr>
+                                        <p:cTn id="20" dur="1" fill="hold">
+                                          <p:stCondLst>
+                                            <p:cond delay="0"/>
+                                          </p:stCondLst>
+                                        </p:cTn>
+                                        <p:tgtEl>
+                                          <p:spTgt spid="3">
+                                            <p:txEl>
+                                              <p:pRg st="9" end="9"/>
+                                            </p:txEl>
+                                          </p:spTgt>
+                                        </p:tgtEl>
+                                        <p:attrNameLst>
+                                          <p:attrName>style.visibility</p:attrName>
+                                        </p:attrNameLst>
+                                      </p:cBhvr>
+                                      <p:to>
+                                        <p:strVal val="visible"/>
+                                      </p:to>
+                                    </p:set>
+                                  </p:childTnLst>
+                                </p:cTn>
+                              </p:par>
+                              <p:par>
+                                <p:cTn id="21" presetID="1" presetClass="entr" presetSubtype="0" fill="hold" nodeType="withEffect">
+                                  <p:stCondLst>
+                                    <p:cond delay="0"/>
+                                  </p:stCondLst>
+                                  <p:childTnLst>
+                                    <p:set>
+                                      <p:cBhvr>
+                                        <p:cTn id="22" dur="1" fill="hold">
+                                          <p:stCondLst>
+                                            <p:cond delay="0"/>
+                                          </p:stCondLst>
+                                        </p:cTn>
+                                        <p:tgtEl>
+                                          <p:spTgt spid="3">
+                                            <p:txEl>
+                                              <p:pRg st="10" end="10"/>
+                                            </p:txEl>
+                                          </p:spTgt>
+                                        </p:tgtEl>
+                                        <p:attrNameLst>
+                                          <p:attrName>style.visibility</p:attrName>
+                                        </p:attrNameLst>
+                                      </p:cBhvr>
+                                      <p:to>
+                                        <p:strVal val="visible"/>
+                                      </p:to>
+                                    </p:set>
+                                  </p:childTnLst>
+                                </p:cTn>
+                              </p:par>
+                              <p:par>
+                                <p:cTn id="23" presetID="1" presetClass="entr" presetSubtype="0" fill="hold" nodeType="withEffect">
+                                  <p:stCondLst>
+                                    <p:cond delay="0"/>
+                                  </p:stCondLst>
+                                  <p:childTnLst>
+                                    <p:set>
+                                      <p:cBhvr>
+                                        <p:cTn id="24" dur="1" fill="hold">
+                                          <p:stCondLst>
+                                            <p:cond delay="0"/>
+                                          </p:stCondLst>
+                                        </p:cTn>
+                                        <p:tgtEl>
+                                          <p:spTgt spid="3">
+                                            <p:txEl>
+                                              <p:pRg st="11" end="11"/>
+                                            </p:txEl>
+                                          </p:spTgt>
+                                        </p:tgtEl>
+                                        <p:attrNameLst>
+                                          <p:attrName>style.visibility</p:attrName>
+                                        </p:attrNameLst>
+                                      </p:cBhvr>
+                                      <p:to>
+                                        <p:strVal val="visible"/>
+                                      </p:to>
+                                    </p:set>
+                                  </p:childTnLst>
+                                </p:cTn>
+                              </p:par>
+                            </p:childTnLst>
+                          </p:cTn>
+                        </p:par>
+                      </p:childTnLst>
+                    </p:cTn>
+                  </p:par>
+                  <p:par>
+                    <p:cTn id="25" fill="hold">
+                      <p:stCondLst>
+                        <p:cond delay="indefinite"/>
+                      </p:stCondLst>
+                      <p:childTnLst>
+                        <p:par>
+                          <p:cTn id="26" fill="hold">
+                            <p:stCondLst>
+                              <p:cond delay="0"/>
+                            </p:stCondLst>
+                            <p:childTnLst>
+                              <p:par>
+                                <p:cTn id="27" presetID="1" presetClass="entr" presetSubtype="0" fill="hold" nodeType="clickEffect">
+                                  <p:stCondLst>
+                                    <p:cond delay="0"/>
+                                  </p:stCondLst>
+                                  <p:childTnLst>
+                                    <p:set>
+                                      <p:cBhvr>
+                                        <p:cTn id="28" dur="1" fill="hold">
+                                          <p:stCondLst>
+                                            <p:cond delay="0"/>
+                                          </p:stCondLst>
+                                        </p:cTn>
+                                        <p:tgtEl>
+                                          <p:spTgt spid="3">
+                                            <p:txEl>
+                                              <p:pRg st="12" end="12"/>
+                                            </p:txEl>
+                                          </p:spTgt>
+                                        </p:tgtEl>
+                                        <p:attrNameLst>
+                                          <p:attrName>style.visibility</p:attrName>
+                                        </p:attrNameLst>
+                                      </p:cBhvr>
+                                      <p:to>
+                                        <p:strVal val="visible"/>
+                                      </p:to>
+                                    </p:set>
+                                  </p:childTnLst>
+                                </p:cTn>
+                              </p:par>
+                              <p:par>
+                                <p:cTn id="29" presetID="1" presetClass="entr" presetSubtype="0" fill="hold" nodeType="withEffect">
+                                  <p:stCondLst>
+                                    <p:cond delay="0"/>
+                                  </p:stCondLst>
+                                  <p:childTnLst>
+                                    <p:set>
+                                      <p:cBhvr>
+                                        <p:cTn id="30" dur="1" fill="hold">
+                                          <p:stCondLst>
+                                            <p:cond delay="0"/>
+                                          </p:stCondLst>
+                                        </p:cTn>
+                                        <p:tgtEl>
+                                          <p:spTgt spid="3">
+                                            <p:txEl>
+                                              <p:pRg st="13" end="13"/>
+                                            </p:txEl>
+                                          </p:spTgt>
+                                        </p:tgtEl>
+                                        <p:attrNameLst>
+                                          <p:attrName>style.visibility</p:attrName>
+                                        </p:attrNameLst>
+                                      </p:cBhvr>
+                                      <p:to>
+                                        <p:strVal val="visible"/>
+                                      </p:to>
+                                    </p:set>
+                                  </p:childTnLst>
+                                </p:cTn>
+                              </p:par>
+                              <p:par>
+                                <p:cTn id="31" presetID="1" presetClass="entr" presetSubtype="0" fill="hold" nodeType="withEffect">
+                                  <p:stCondLst>
+                                    <p:cond delay="0"/>
+                                  </p:stCondLst>
+                                  <p:childTnLst>
+                                    <p:set>
+                                      <p:cBhvr>
+                                        <p:cTn id="32" dur="1" fill="hold">
+                                          <p:stCondLst>
+                                            <p:cond delay="0"/>
+                                          </p:stCondLst>
+                                        </p:cTn>
+                                        <p:tgtEl>
+                                          <p:spTgt spid="3">
+                                            <p:txEl>
+                                              <p:pRg st="14" end="14"/>
+                                            </p:txEl>
+                                          </p:spTgt>
+                                        </p:tgtEl>
+                                        <p:attrNameLst>
+                                          <p:attrName>style.visibility</p:attrName>
+                                        </p:attrNameLst>
+                                      </p:cBhvr>
+                                      <p:to>
+                                        <p:strVal val="visible"/>
+                                      </p:to>
+                                    </p:set>
+                                  </p:childTnLst>
+                                </p:cTn>
+                              </p:par>
+                              <p:par>
+                                <p:cTn id="33" presetID="1" presetClass="entr" presetSubtype="0" fill="hold" nodeType="withEffect">
+                                  <p:stCondLst>
+                                    <p:cond delay="0"/>
+                                  </p:stCondLst>
+                                  <p:childTnLst>
+                                    <p:set>
+                                      <p:cBhvr>
+                                        <p:cTn id="34" dur="1" fill="hold">
+                                          <p:stCondLst>
+                                            <p:cond delay="0"/>
+                                          </p:stCondLst>
+                                        </p:cTn>
+                                        <p:tgtEl>
+                                          <p:spTgt spid="3">
+                                            <p:txEl>
+                                              <p:pRg st="15" end="15"/>
+                                            </p:txEl>
+                                          </p:spTgt>
+                                        </p:tgtEl>
+                                        <p:attrNameLst>
+                                          <p:attrName>style.visibility</p:attrName>
+                                        </p:attrNameLst>
+                                      </p:cBhvr>
+                                      <p:to>
+                                        <p:strVal val="visible"/>
+                                      </p:to>
+                                    </p:set>
+                                  </p:childTnLst>
+                                </p:cTn>
+                              </p:par>
+                            </p:childTnLst>
+                          </p:cTn>
+                        </p:par>
+                      </p:childTnLst>
+                    </p:cTn>
+                  </p:par>
+                  <p:par>
+                    <p:cTn id="35" fill="hold">
+                      <p:stCondLst>
+                        <p:cond delay="indefinite"/>
+                      </p:stCondLst>
+                      <p:childTnLst>
+                        <p:par>
+                          <p:cTn id="36" fill="hold">
+                            <p:stCondLst>
+                              <p:cond delay="0"/>
+                            </p:stCondLst>
+                            <p:childTnLst>
+                              <p:par>
+                                <p:cTn id="37" presetID="1" presetClass="entr" presetSubtype="0" fill="hold" nodeType="clickEffect">
+                                  <p:stCondLst>
+                                    <p:cond delay="0"/>
+                                  </p:stCondLst>
+                                  <p:childTnLst>
+                                    <p:set>
+                                      <p:cBhvr>
+                                        <p:cTn id="38" dur="1" fill="hold">
+                                          <p:stCondLst>
+                                            <p:cond delay="0"/>
+                                          </p:stCondLst>
+                                        </p:cTn>
+                                        <p:tgtEl>
+                                          <p:spTgt spid="17"/>
+                                        </p:tgtEl>
+                                        <p:attrNameLst>
+                                          <p:attrName>style.visibility</p:attrName>
+                                        </p:attrNameLst>
+                                      </p:cBhvr>
+                                      <p:to>
+                                        <p:strVal val="visible"/>
+                                      </p:to>
+                                    </p:set>
+                                  </p:childTnLst>
+                                </p:cTn>
+                              </p:par>
+                              <p:par>
+                                <p:cTn id="39" presetID="1" presetClass="entr" presetSubtype="0" fill="hold" grpId="0" nodeType="withEffect">
+                                  <p:stCondLst>
+                                    <p:cond delay="0"/>
+                                  </p:stCondLst>
+                                  <p:childTnLst>
+                                    <p:set>
+                                      <p:cBhvr>
+                                        <p:cTn id="40" dur="1" fill="hold">
+                                          <p:stCondLst>
+                                            <p:cond delay="0"/>
+                                          </p:stCondLst>
+                                        </p:cTn>
+                                        <p:tgtEl>
+                                          <p:spTgt spid="18"/>
+                                        </p:tgtEl>
+                                        <p:attrNameLst>
+                                          <p:attrName>style.visibility</p:attrName>
+                                        </p:attrNameLst>
+                                      </p:cBhvr>
+                                      <p:to>
+                                        <p:strVal val="visible"/>
+                                      </p:to>
+                                    </p:set>
+                                  </p:childTnLst>
+                                </p:cTn>
+                              </p:par>
+                              <p:par>
+                                <p:cTn id="41" presetID="1" presetClass="entr" presetSubtype="0" fill="hold" nodeType="withEffect">
+                                  <p:stCondLst>
+                                    <p:cond delay="0"/>
+                                  </p:stCondLst>
+                                  <p:childTnLst>
+                                    <p:set>
+                                      <p:cBhvr>
+                                        <p:cTn id="42" dur="1" fill="hold">
+                                          <p:stCondLst>
+                                            <p:cond delay="0"/>
+                                          </p:stCondLst>
+                                        </p:cTn>
+                                        <p:tgtEl>
+                                          <p:spTgt spid="19"/>
+                                        </p:tgtEl>
+                                        <p:attrNameLst>
+                                          <p:attrName>style.visibility</p:attrName>
+                                        </p:attrNameLst>
+                                      </p:cBhvr>
+                                      <p:to>
+                                        <p:strVal val="visible"/>
+                                      </p:to>
+                                    </p:set>
+                                  </p:childTnLst>
+                                </p:cTn>
+                              </p:par>
+                            </p:childTnLst>
+                          </p:cTn>
+                        </p:par>
+                      </p:childTnLst>
+                    </p:cTn>
+                  </p:par>
+                  <p:par>
+                    <p:cTn id="43" fill="hold">
+                      <p:stCondLst>
+                        <p:cond delay="indefinite"/>
+                      </p:stCondLst>
+                      <p:childTnLst>
+                        <p:par>
+                          <p:cTn id="44" fill="hold">
+                            <p:stCondLst>
+                              <p:cond delay="0"/>
+                            </p:stCondLst>
+                            <p:childTnLst>
+                              <p:par>
+                                <p:cTn id="45" presetID="1" presetClass="entr" presetSubtype="0" fill="hold" nodeType="clickEffect">
+                                  <p:stCondLst>
+                                    <p:cond delay="0"/>
+                                  </p:stCondLst>
+                                  <p:childTnLst>
+                                    <p:set>
+                                      <p:cBhvr>
+                                        <p:cTn id="46" dur="1" fill="hold">
+                                          <p:stCondLst>
+                                            <p:cond delay="0"/>
+                                          </p:stCondLst>
+                                        </p:cTn>
+                                        <p:tgtEl>
+                                          <p:spTgt spid="3">
+                                            <p:txEl>
+                                              <p:pRg st="16" end="16"/>
+                                            </p:txEl>
+                                          </p:spTgt>
+                                        </p:tgtEl>
+                                        <p:attrNameLst>
+                                          <p:attrName>style.visibility</p:attrName>
+                                        </p:attrNameLst>
+                                      </p:cBhvr>
+                                      <p:to>
+                                        <p:strVal val="visible"/>
+                                      </p:to>
+                                    </p:set>
+                                  </p:childTnLst>
+                                </p:cTn>
+                              </p:par>
+                              <p:par>
+                                <p:cTn id="47" presetID="1" presetClass="entr" presetSubtype="0" fill="hold" nodeType="withEffect">
+                                  <p:stCondLst>
+                                    <p:cond delay="0"/>
+                                  </p:stCondLst>
+                                  <p:childTnLst>
+                                    <p:set>
+                                      <p:cBhvr>
+                                        <p:cTn id="48" dur="1" fill="hold">
+                                          <p:stCondLst>
+                                            <p:cond delay="0"/>
+                                          </p:stCondLst>
+                                        </p:cTn>
+                                        <p:tgtEl>
+                                          <p:spTgt spid="3">
+                                            <p:txEl>
+                                              <p:pRg st="17" end="17"/>
+                                            </p:txEl>
+                                          </p:spTgt>
+                                        </p:tgtEl>
+                                        <p:attrNameLst>
+                                          <p:attrName>style.visibility</p:attrName>
+                                        </p:attrNameLst>
+                                      </p:cBhvr>
+                                      <p:to>
+                                        <p:strVal val="visible"/>
+                                      </p:to>
+                                    </p:set>
+                                  </p:childTnLst>
+                                </p:cTn>
+                              </p:par>
+                              <p:par>
+                                <p:cTn id="49" presetID="1" presetClass="entr" presetSubtype="0" fill="hold" nodeType="withEffect">
+                                  <p:stCondLst>
+                                    <p:cond delay="0"/>
+                                  </p:stCondLst>
+                                  <p:childTnLst>
+                                    <p:set>
+                                      <p:cBhvr>
+                                        <p:cTn id="50" dur="1" fill="hold">
+                                          <p:stCondLst>
+                                            <p:cond delay="0"/>
+                                          </p:stCondLst>
+                                        </p:cTn>
+                                        <p:tgtEl>
+                                          <p:spTgt spid="3">
+                                            <p:txEl>
+                                              <p:pRg st="18" end="18"/>
+                                            </p:txEl>
+                                          </p:spTgt>
+                                        </p:tgtEl>
+                                        <p:attrNameLst>
+                                          <p:attrName>style.visibility</p:attrName>
+                                        </p:attrNameLst>
+                                      </p:cBhvr>
+                                      <p:to>
+                                        <p:strVal val="visible"/>
+                                      </p:to>
+                                    </p:set>
+                                  </p:childTnLst>
+                                </p:cTn>
+                              </p:par>
+                              <p:par>
+                                <p:cTn id="51" presetID="1" presetClass="entr" presetSubtype="0" fill="hold" nodeType="withEffect">
+                                  <p:stCondLst>
+                                    <p:cond delay="0"/>
+                                  </p:stCondLst>
+                                  <p:childTnLst>
+                                    <p:set>
+                                      <p:cBhvr>
+                                        <p:cTn id="52" dur="1" fill="hold">
+                                          <p:stCondLst>
+                                            <p:cond delay="0"/>
+                                          </p:stCondLst>
+                                        </p:cTn>
+                                        <p:tgtEl>
+                                          <p:spTgt spid="3">
+                                            <p:txEl>
+                                              <p:pRg st="19" end="19"/>
+                                            </p:txEl>
+                                          </p:spTgt>
+                                        </p:tgtEl>
+                                        <p:attrNameLst>
+                                          <p:attrName>style.visibility</p:attrName>
+                                        </p:attrNameLst>
+                                      </p:cBhvr>
+                                      <p:to>
+                                        <p:strVal val="visible"/>
+                                      </p:to>
+                                    </p:set>
+                                  </p:childTnLst>
+                                </p:cTn>
+                              </p:par>
+                              <p:par>
+                                <p:cTn id="53" presetID="1" presetClass="entr" presetSubtype="0" fill="hold" nodeType="withEffect">
+                                  <p:stCondLst>
+                                    <p:cond delay="0"/>
+                                  </p:stCondLst>
+                                  <p:childTnLst>
+                                    <p:set>
+                                      <p:cBhvr>
+                                        <p:cTn id="54" dur="1" fill="hold">
+                                          <p:stCondLst>
+                                            <p:cond delay="0"/>
+                                          </p:stCondLst>
+                                        </p:cTn>
+                                        <p:tgtEl>
+                                          <p:spTgt spid="3">
+                                            <p:txEl>
+                                              <p:pRg st="20" end="20"/>
+                                            </p:txEl>
+                                          </p:spTgt>
+                                        </p:tgtEl>
+                                        <p:attrNameLst>
+                                          <p:attrName>style.visibility</p:attrName>
+                                        </p:attrNameLst>
+                                      </p:cBhvr>
+                                      <p:to>
+                                        <p:strVal val="visible"/>
+                                      </p:to>
+                                    </p:set>
+                                  </p:childTnLst>
+                                </p:cTn>
+                              </p:par>
+                            </p:childTnLst>
+                          </p:cTn>
+                        </p:par>
+                      </p:childTnLst>
+                    </p:cTn>
+                  </p:par>
+                </p:childTnLst>
+              </p:cTn>
+              <p:prevCondLst>
+                <p:cond evt="onPrev" delay="0">
+                  <p:tgtEl>
+                    <p:sldTgt/>
+                  </p:tgtEl>
+                </p:cond>
+              </p:prevCondLst>
+              <p:nextCondLst>
+                <p:cond evt="onNext" delay="0">
+                  <p:tgtEl>
+                    <p:sldTgt/>
+                  </p:tgtEl>
+                </p:cond>
+              </p:nextCondLst>
+            </p:seq>
+          </p:childTnLst>
+        </p:cTn>
       </p:par>
     </p:tnLst>
+    <p:bldLst>
+      <p:bldP spid="10" grpId="0" animBg="1"/>
+      <p:bldP spid="18" grpId="0" animBg="1"/>
+    </p:bldLst>
   </p:timing>
 </p:sld>
 </file>
@@ -7834,6 +8544,114 @@
             <a:endParaRPr lang="en-US" altLang="ja-JP" sz="1200" dirty="0" smtClean="0"/>
           </a:p>
           <a:p>
+            <a:pPr marL="457200" lvl="1" indent="0">
+              <a:buNone/>
+            </a:pPr>
+            <a:r>
+              <a:rPr lang="ja-JP" altLang="en-US" sz="1200" dirty="0"/>
+              <a:t>関数例</a:t>
+            </a:r>
+            <a:r>
+              <a:rPr lang="en-US" altLang="ja-JP" sz="1200" dirty="0"/>
+              <a:t>:  </a:t>
+            </a:r>
+            <a:r>
+              <a:rPr lang="en-US" altLang="ja-JP" sz="1200" dirty="0" err="1"/>
+              <a:t>nm_data</a:t>
+            </a:r>
+            <a:r>
+              <a:rPr lang="en-US" altLang="ja-JP" sz="1200" dirty="0"/>
+              <a:t> %&gt;% </a:t>
+            </a:r>
+            <a:r>
+              <a:rPr lang="en-US" altLang="ja-JP" sz="1200" dirty="0" smtClean="0">
+                <a:solidFill>
+                  <a:srgbClr val="0070C0"/>
+                </a:solidFill>
+              </a:rPr>
+              <a:t>mutate</a:t>
+            </a:r>
+            <a:r>
+              <a:rPr lang="en-US" altLang="ja-JP" sz="1200" dirty="0" smtClean="0"/>
+              <a:t>(</a:t>
+            </a:r>
+            <a:r>
+              <a:rPr lang="nb-NO" altLang="ja-JP" sz="1200" dirty="0" smtClean="0">
+                <a:solidFill>
+                  <a:srgbClr val="0070C0"/>
+                </a:solidFill>
+              </a:rPr>
+              <a:t>ifelse</a:t>
+            </a:r>
+            <a:r>
+              <a:rPr lang="nb-NO" altLang="ja-JP" sz="1200" dirty="0" smtClean="0"/>
+              <a:t>(MALE </a:t>
+            </a:r>
+            <a:r>
+              <a:rPr lang="nb-NO" altLang="ja-JP" sz="1200" dirty="0"/>
+              <a:t>== </a:t>
+            </a:r>
+            <a:r>
+              <a:rPr lang="nb-NO" altLang="ja-JP" sz="1200" dirty="0" smtClean="0"/>
+              <a:t>0, </a:t>
+            </a:r>
+            <a:r>
+              <a:rPr lang="nb-NO" altLang="ja-JP" sz="1200" dirty="0"/>
+              <a:t>50 + 0.91*(HT-152.4), 45.5 + 0.91*(HT-152.4))</a:t>
+            </a:r>
+            <a:r>
+              <a:rPr lang="en-US" altLang="ja-JP" sz="1200" dirty="0" smtClean="0"/>
+              <a:t>)</a:t>
+            </a:r>
+            <a:endParaRPr lang="en-US" altLang="ja-JP" sz="1200" dirty="0"/>
+          </a:p>
+          <a:p>
+            <a:pPr marL="457200" lvl="1" indent="0">
+              <a:buNone/>
+            </a:pPr>
+            <a:r>
+              <a:rPr lang="ja-JP" altLang="en-US" sz="1200" dirty="0"/>
+              <a:t>意味： </a:t>
+            </a:r>
+            <a:r>
+              <a:rPr lang="en-US" altLang="ja-JP" sz="1200" dirty="0" err="1"/>
+              <a:t>nm_data</a:t>
+            </a:r>
+            <a:r>
+              <a:rPr lang="ja-JP" altLang="en-US" sz="1200" dirty="0"/>
+              <a:t>に新たに</a:t>
+            </a:r>
+            <a:r>
+              <a:rPr lang="en-US" altLang="ja-JP" sz="1200" dirty="0" smtClean="0"/>
+              <a:t>IBW</a:t>
+            </a:r>
+            <a:r>
+              <a:rPr lang="ja-JP" altLang="en-US" sz="1200" dirty="0" smtClean="0"/>
+              <a:t>と</a:t>
+            </a:r>
+            <a:r>
+              <a:rPr lang="ja-JP" altLang="en-US" sz="1200" dirty="0"/>
+              <a:t>いう列を</a:t>
+            </a:r>
+            <a:r>
+              <a:rPr lang="ja-JP" altLang="en-US" sz="1200" dirty="0" smtClean="0"/>
+              <a:t>作成</a:t>
+            </a:r>
+            <a:r>
+              <a:rPr lang="en-US" altLang="ja-JP" sz="1200" dirty="0" smtClean="0"/>
+              <a:t>(</a:t>
+            </a:r>
+            <a:r>
+              <a:rPr lang="ja-JP" altLang="en-US" sz="1200" dirty="0" smtClean="0"/>
+              <a:t>性別で式を変える</a:t>
+            </a:r>
+            <a:r>
+              <a:rPr lang="en-US" altLang="ja-JP" sz="1200" dirty="0" smtClean="0"/>
+              <a:t>)</a:t>
+            </a:r>
+            <a:endParaRPr lang="en-US" altLang="ja-JP" sz="1200" dirty="0" smtClean="0"/>
+          </a:p>
+          <a:p>
             <a:r>
               <a:rPr lang="en-US" altLang="ja-JP" sz="2000" dirty="0" err="1" smtClean="0">
                 <a:solidFill>
@@ -8140,6 +8958,933 @@
           </a:p>
         </p:txBody>
       </p:sp>
+      <p:graphicFrame>
+        <p:nvGraphicFramePr>
+          <p:cNvPr id="7" name="表 6"/>
+          <p:cNvGraphicFramePr>
+            <a:graphicFrameLocks noGrp="1"/>
+          </p:cNvGraphicFramePr>
+          <p:nvPr>
+            <p:extLst>
+              <p:ext uri="{D42A27DB-BD31-4B8C-83A1-F6EECF244321}">
+                <p14:modId xmlns:p14="http://schemas.microsoft.com/office/powerpoint/2010/main" val="3737698323"/>
+              </p:ext>
+            </p:extLst>
+          </p:nvPr>
+        </p:nvGraphicFramePr>
+        <p:xfrm>
+          <a:off x="7967921" y="1768491"/>
+          <a:ext cx="768642" cy="1135912"/>
+        </p:xfrm>
+        <a:graphic>
+          <a:graphicData uri="http://schemas.openxmlformats.org/drawingml/2006/table">
+            <a:tbl>
+              <a:tblPr firstRow="1" bandRow="1">
+                <a:tableStyleId>{5C22544A-7EE6-4342-B048-85BDC9FD1C3A}</a:tableStyleId>
+              </a:tblPr>
+              <a:tblGrid>
+                <a:gridCol w="384321"/>
+                <a:gridCol w="384321"/>
+              </a:tblGrid>
+              <a:tr h="283978">
+                <a:tc>
+                  <a:txBody>
+                    <a:bodyPr/>
+                    <a:lstStyle/>
+                    <a:p>
+                      <a:pPr algn="ctr"/>
+                      <a:r>
+                        <a:rPr kumimoji="1" lang="en-US" altLang="ja-JP" sz="900" dirty="0" smtClean="0"/>
+                        <a:t>ID</a:t>
+                      </a:r>
+                      <a:endParaRPr kumimoji="1" lang="ja-JP" altLang="en-US" sz="900" dirty="0"/>
+                    </a:p>
+                  </a:txBody>
+                  <a:tcPr marL="36000" marR="36000" marT="36000" marB="36000" anchor="ctr"/>
+                </a:tc>
+                <a:tc>
+                  <a:txBody>
+                    <a:bodyPr/>
+                    <a:lstStyle/>
+                    <a:p>
+                      <a:pPr algn="ctr"/>
+                      <a:r>
+                        <a:rPr kumimoji="1" lang="en-US" altLang="ja-JP" sz="900" dirty="0" smtClean="0"/>
+                        <a:t>HT</a:t>
+                      </a:r>
+                      <a:endParaRPr kumimoji="1" lang="ja-JP" altLang="en-US" sz="900" dirty="0"/>
+                    </a:p>
+                  </a:txBody>
+                  <a:tcPr marL="36000" marR="36000" marT="36000" marB="36000" anchor="ctr"/>
+                </a:tc>
+              </a:tr>
+              <a:tr h="283978">
+                <a:tc>
+                  <a:txBody>
+                    <a:bodyPr/>
+                    <a:lstStyle/>
+                    <a:p>
+                      <a:pPr marL="0" algn="ctr" defTabSz="914400" rtl="0" eaLnBrk="1" latinLnBrk="0" hangingPunct="1"/>
+                      <a:r>
+                        <a:rPr kumimoji="1" lang="en-US" altLang="ja-JP" sz="900" kern="1200" dirty="0" smtClean="0"/>
+                        <a:t>1</a:t>
+                      </a:r>
+                      <a:endParaRPr kumimoji="1" lang="ja-JP" altLang="en-US" sz="900" kern="1200" dirty="0">
+                        <a:solidFill>
+                          <a:schemeClr val="dk1"/>
+                        </a:solidFill>
+                        <a:latin typeface="+mn-lt"/>
+                        <a:ea typeface="+mn-ea"/>
+                        <a:cs typeface="+mn-cs"/>
+                      </a:endParaRPr>
+                    </a:p>
+                  </a:txBody>
+                  <a:tcPr marL="36000" marR="36000" marT="36000" marB="36000" anchor="ctr"/>
+                </a:tc>
+                <a:tc>
+                  <a:txBody>
+                    <a:bodyPr/>
+                    <a:lstStyle/>
+                    <a:p>
+                      <a:pPr marL="0" algn="ctr" defTabSz="914400" rtl="0" eaLnBrk="1" latinLnBrk="0" hangingPunct="1"/>
+                      <a:r>
+                        <a:rPr kumimoji="1" lang="en-US" altLang="ja-JP" sz="900" kern="1200" dirty="0" smtClean="0"/>
+                        <a:t>160</a:t>
+                      </a:r>
+                      <a:endParaRPr kumimoji="1" lang="ja-JP" altLang="en-US" sz="900" kern="1200" dirty="0">
+                        <a:solidFill>
+                          <a:schemeClr val="dk1"/>
+                        </a:solidFill>
+                        <a:latin typeface="+mn-lt"/>
+                        <a:ea typeface="+mn-ea"/>
+                        <a:cs typeface="+mn-cs"/>
+                      </a:endParaRPr>
+                    </a:p>
+                  </a:txBody>
+                  <a:tcPr marL="36000" marR="36000" marT="36000" marB="36000" anchor="ctr"/>
+                </a:tc>
+              </a:tr>
+              <a:tr h="283978">
+                <a:tc>
+                  <a:txBody>
+                    <a:bodyPr/>
+                    <a:lstStyle/>
+                    <a:p>
+                      <a:pPr algn="ctr"/>
+                      <a:r>
+                        <a:rPr kumimoji="1" lang="en-US" altLang="ja-JP" sz="900" dirty="0" smtClean="0"/>
+                        <a:t>2</a:t>
+                      </a:r>
+                      <a:endParaRPr kumimoji="1" lang="ja-JP" altLang="en-US" sz="900" dirty="0"/>
+                    </a:p>
+                  </a:txBody>
+                  <a:tcPr marL="36000" marR="36000" marT="36000" marB="36000" anchor="ctr"/>
+                </a:tc>
+                <a:tc>
+                  <a:txBody>
+                    <a:bodyPr/>
+                    <a:lstStyle/>
+                    <a:p>
+                      <a:pPr algn="ctr"/>
+                      <a:r>
+                        <a:rPr kumimoji="1" lang="en-US" altLang="ja-JP" sz="900" dirty="0" smtClean="0"/>
+                        <a:t>170</a:t>
+                      </a:r>
+                      <a:endParaRPr kumimoji="1" lang="ja-JP" altLang="en-US" sz="900" dirty="0"/>
+                    </a:p>
+                  </a:txBody>
+                  <a:tcPr marL="36000" marR="36000" marT="36000" marB="36000" anchor="ctr"/>
+                </a:tc>
+              </a:tr>
+              <a:tr h="283978">
+                <a:tc>
+                  <a:txBody>
+                    <a:bodyPr/>
+                    <a:lstStyle/>
+                    <a:p>
+                      <a:pPr algn="ctr"/>
+                      <a:r>
+                        <a:rPr kumimoji="1" lang="en-US" altLang="ja-JP" sz="900" dirty="0" smtClean="0"/>
+                        <a:t>3</a:t>
+                      </a:r>
+                    </a:p>
+                  </a:txBody>
+                  <a:tcPr marL="36000" marR="36000" marT="36000" marB="36000" anchor="ctr"/>
+                </a:tc>
+                <a:tc>
+                  <a:txBody>
+                    <a:bodyPr/>
+                    <a:lstStyle/>
+                    <a:p>
+                      <a:pPr algn="ctr"/>
+                      <a:r>
+                        <a:rPr kumimoji="1" lang="en-US" altLang="ja-JP" sz="900" dirty="0" smtClean="0"/>
+                        <a:t>180</a:t>
+                      </a:r>
+                      <a:endParaRPr kumimoji="1" lang="ja-JP" altLang="en-US" sz="900" dirty="0"/>
+                    </a:p>
+                  </a:txBody>
+                  <a:tcPr marL="36000" marR="36000" marT="36000" marB="36000" anchor="ctr"/>
+                </a:tc>
+              </a:tr>
+            </a:tbl>
+          </a:graphicData>
+        </a:graphic>
+      </p:graphicFrame>
+      <p:sp>
+        <p:nvSpPr>
+          <p:cNvPr id="8" name="右矢印 7"/>
+          <p:cNvSpPr/>
+          <p:nvPr/>
+        </p:nvSpPr>
+        <p:spPr>
+          <a:xfrm>
+            <a:off x="8958455" y="2096500"/>
+            <a:ext cx="1233405" cy="479894"/>
+          </a:xfrm>
+          <a:prstGeom prst="rightArrow">
+            <a:avLst>
+              <a:gd name="adj1" fmla="val 100000"/>
+              <a:gd name="adj2" fmla="val 36463"/>
+            </a:avLst>
+          </a:prstGeom>
+          <a:solidFill>
+            <a:srgbClr val="92D050"/>
+          </a:solidFill>
+          <a:ln>
+            <a:noFill/>
+          </a:ln>
+        </p:spPr>
+        <p:style>
+          <a:lnRef idx="2">
+            <a:schemeClr val="accent1">
+              <a:shade val="50000"/>
+            </a:schemeClr>
+          </a:lnRef>
+          <a:fillRef idx="1">
+            <a:schemeClr val="accent1"/>
+          </a:fillRef>
+          <a:effectRef idx="0">
+            <a:schemeClr val="accent1"/>
+          </a:effectRef>
+          <a:fontRef idx="minor">
+            <a:schemeClr val="lt1"/>
+          </a:fontRef>
+        </p:style>
+        <p:txBody>
+          <a:bodyPr rtlCol="0" anchor="ctr"/>
+          <a:lstStyle/>
+          <a:p>
+            <a:pPr algn="ctr"/>
+            <a:r>
+              <a:rPr lang="en-US" altLang="ja-JP" sz="1000" dirty="0">
+                <a:solidFill>
+                  <a:schemeClr val="tx1"/>
+                </a:solidFill>
+              </a:rPr>
+              <a:t>mutate(IBW = </a:t>
+            </a:r>
+            <a:r>
+              <a:rPr lang="en-US" altLang="ja-JP" sz="1000" dirty="0" smtClean="0">
+                <a:solidFill>
+                  <a:schemeClr val="tx1"/>
+                </a:solidFill>
+              </a:rPr>
+              <a:t>22*(</a:t>
+            </a:r>
+            <a:r>
+              <a:rPr lang="en-US" altLang="ja-JP" sz="1000" dirty="0">
+                <a:solidFill>
+                  <a:schemeClr val="tx1"/>
+                </a:solidFill>
+              </a:rPr>
+              <a:t>HT/100)^2)</a:t>
+            </a:r>
+          </a:p>
+        </p:txBody>
+      </p:sp>
+      <p:graphicFrame>
+        <p:nvGraphicFramePr>
+          <p:cNvPr id="9" name="表 8"/>
+          <p:cNvGraphicFramePr>
+            <a:graphicFrameLocks noGrp="1"/>
+          </p:cNvGraphicFramePr>
+          <p:nvPr>
+            <p:extLst>
+              <p:ext uri="{D42A27DB-BD31-4B8C-83A1-F6EECF244321}">
+                <p14:modId xmlns:p14="http://schemas.microsoft.com/office/powerpoint/2010/main" val="4292310598"/>
+              </p:ext>
+            </p:extLst>
+          </p:nvPr>
+        </p:nvGraphicFramePr>
+        <p:xfrm>
+          <a:off x="10413750" y="1768491"/>
+          <a:ext cx="1028832" cy="1135912"/>
+        </p:xfrm>
+        <a:graphic>
+          <a:graphicData uri="http://schemas.openxmlformats.org/drawingml/2006/table">
+            <a:tbl>
+              <a:tblPr firstRow="1" bandRow="1">
+                <a:tableStyleId>{5C22544A-7EE6-4342-B048-85BDC9FD1C3A}</a:tableStyleId>
+              </a:tblPr>
+              <a:tblGrid>
+                <a:gridCol w="342944"/>
+                <a:gridCol w="342944"/>
+                <a:gridCol w="342944"/>
+              </a:tblGrid>
+              <a:tr h="283978">
+                <a:tc>
+                  <a:txBody>
+                    <a:bodyPr/>
+                    <a:lstStyle/>
+                    <a:p>
+                      <a:pPr algn="ctr"/>
+                      <a:r>
+                        <a:rPr kumimoji="1" lang="en-US" altLang="ja-JP" sz="900" dirty="0" smtClean="0"/>
+                        <a:t>ID</a:t>
+                      </a:r>
+                      <a:endParaRPr kumimoji="1" lang="ja-JP" altLang="en-US" sz="900" dirty="0"/>
+                    </a:p>
+                  </a:txBody>
+                  <a:tcPr marL="36000" marR="36000" marT="36000" marB="36000" anchor="ctr"/>
+                </a:tc>
+                <a:tc>
+                  <a:txBody>
+                    <a:bodyPr/>
+                    <a:lstStyle/>
+                    <a:p>
+                      <a:pPr algn="ctr"/>
+                      <a:r>
+                        <a:rPr kumimoji="1" lang="en-US" altLang="ja-JP" sz="900" dirty="0" smtClean="0"/>
+                        <a:t>HT</a:t>
+                      </a:r>
+                      <a:endParaRPr kumimoji="1" lang="ja-JP" altLang="en-US" sz="900" dirty="0"/>
+                    </a:p>
+                  </a:txBody>
+                  <a:tcPr marL="36000" marR="36000" marT="36000" marB="36000" anchor="ctr"/>
+                </a:tc>
+                <a:tc>
+                  <a:txBody>
+                    <a:bodyPr/>
+                    <a:lstStyle/>
+                    <a:p>
+                      <a:pPr algn="ctr"/>
+                      <a:r>
+                        <a:rPr kumimoji="1" lang="en-US" altLang="ja-JP" sz="900" dirty="0" smtClean="0"/>
+                        <a:t>IBW</a:t>
+                      </a:r>
+                      <a:endParaRPr kumimoji="1" lang="ja-JP" altLang="en-US" sz="900" dirty="0"/>
+                    </a:p>
+                  </a:txBody>
+                  <a:tcPr marL="36000" marR="36000" marT="36000" marB="36000" anchor="ctr"/>
+                </a:tc>
+              </a:tr>
+              <a:tr h="283978">
+                <a:tc>
+                  <a:txBody>
+                    <a:bodyPr/>
+                    <a:lstStyle/>
+                    <a:p>
+                      <a:pPr marL="0" algn="ctr" defTabSz="914400" rtl="0" eaLnBrk="1" latinLnBrk="0" hangingPunct="1"/>
+                      <a:r>
+                        <a:rPr kumimoji="1" lang="en-US" altLang="ja-JP" sz="900" kern="1200" dirty="0" smtClean="0"/>
+                        <a:t>1</a:t>
+                      </a:r>
+                      <a:endParaRPr kumimoji="1" lang="ja-JP" altLang="en-US" sz="900" kern="1200" dirty="0">
+                        <a:solidFill>
+                          <a:schemeClr val="dk1"/>
+                        </a:solidFill>
+                        <a:latin typeface="+mn-lt"/>
+                        <a:ea typeface="+mn-ea"/>
+                        <a:cs typeface="+mn-cs"/>
+                      </a:endParaRPr>
+                    </a:p>
+                  </a:txBody>
+                  <a:tcPr marL="36000" marR="36000" marT="36000" marB="36000" anchor="ctr"/>
+                </a:tc>
+                <a:tc>
+                  <a:txBody>
+                    <a:bodyPr/>
+                    <a:lstStyle/>
+                    <a:p>
+                      <a:pPr marL="0" algn="ctr" defTabSz="914400" rtl="0" eaLnBrk="1" latinLnBrk="0" hangingPunct="1"/>
+                      <a:r>
+                        <a:rPr kumimoji="1" lang="en-US" altLang="ja-JP" sz="900" kern="1200" dirty="0" smtClean="0"/>
+                        <a:t>160</a:t>
+                      </a:r>
+                      <a:endParaRPr kumimoji="1" lang="ja-JP" altLang="en-US" sz="900" kern="1200" dirty="0">
+                        <a:solidFill>
+                          <a:schemeClr val="dk1"/>
+                        </a:solidFill>
+                        <a:latin typeface="+mn-lt"/>
+                        <a:ea typeface="+mn-ea"/>
+                        <a:cs typeface="+mn-cs"/>
+                      </a:endParaRPr>
+                    </a:p>
+                  </a:txBody>
+                  <a:tcPr marL="36000" marR="36000" marT="36000" marB="36000" anchor="ctr"/>
+                </a:tc>
+                <a:tc>
+                  <a:txBody>
+                    <a:bodyPr/>
+                    <a:lstStyle/>
+                    <a:p>
+                      <a:pPr marL="0" algn="ctr" defTabSz="914400" rtl="0" eaLnBrk="1" latinLnBrk="0" hangingPunct="1"/>
+                      <a:r>
+                        <a:rPr kumimoji="1" lang="en-US" altLang="ja-JP" sz="900" kern="1200" dirty="0" smtClean="0">
+                          <a:solidFill>
+                            <a:schemeClr val="dk1"/>
+                          </a:solidFill>
+                          <a:latin typeface="+mn-lt"/>
+                          <a:ea typeface="+mn-ea"/>
+                          <a:cs typeface="+mn-cs"/>
+                        </a:rPr>
+                        <a:t>56.3</a:t>
+                      </a:r>
+                      <a:endParaRPr kumimoji="1" lang="ja-JP" altLang="en-US" sz="900" kern="1200" dirty="0">
+                        <a:solidFill>
+                          <a:schemeClr val="dk1"/>
+                        </a:solidFill>
+                        <a:latin typeface="+mn-lt"/>
+                        <a:ea typeface="+mn-ea"/>
+                        <a:cs typeface="+mn-cs"/>
+                      </a:endParaRPr>
+                    </a:p>
+                  </a:txBody>
+                  <a:tcPr marL="36000" marR="36000" marT="36000" marB="36000" anchor="ctr"/>
+                </a:tc>
+              </a:tr>
+              <a:tr h="283978">
+                <a:tc>
+                  <a:txBody>
+                    <a:bodyPr/>
+                    <a:lstStyle/>
+                    <a:p>
+                      <a:pPr algn="ctr"/>
+                      <a:r>
+                        <a:rPr kumimoji="1" lang="en-US" altLang="ja-JP" sz="900" dirty="0" smtClean="0"/>
+                        <a:t>2</a:t>
+                      </a:r>
+                      <a:endParaRPr kumimoji="1" lang="ja-JP" altLang="en-US" sz="900" dirty="0"/>
+                    </a:p>
+                  </a:txBody>
+                  <a:tcPr marL="36000" marR="36000" marT="36000" marB="36000" anchor="ctr"/>
+                </a:tc>
+                <a:tc>
+                  <a:txBody>
+                    <a:bodyPr/>
+                    <a:lstStyle/>
+                    <a:p>
+                      <a:pPr algn="ctr"/>
+                      <a:r>
+                        <a:rPr kumimoji="1" lang="en-US" altLang="ja-JP" sz="900" dirty="0" smtClean="0"/>
+                        <a:t>170</a:t>
+                      </a:r>
+                      <a:endParaRPr kumimoji="1" lang="ja-JP" altLang="en-US" sz="900" dirty="0"/>
+                    </a:p>
+                  </a:txBody>
+                  <a:tcPr marL="36000" marR="36000" marT="36000" marB="36000" anchor="ctr"/>
+                </a:tc>
+                <a:tc>
+                  <a:txBody>
+                    <a:bodyPr/>
+                    <a:lstStyle/>
+                    <a:p>
+                      <a:pPr algn="ctr"/>
+                      <a:r>
+                        <a:rPr kumimoji="1" lang="en-US" altLang="ja-JP" sz="900" dirty="0" smtClean="0"/>
+                        <a:t>63.6</a:t>
+                      </a:r>
+                      <a:endParaRPr kumimoji="1" lang="ja-JP" altLang="en-US" sz="900" dirty="0"/>
+                    </a:p>
+                  </a:txBody>
+                  <a:tcPr marL="36000" marR="36000" marT="36000" marB="36000" anchor="ctr"/>
+                </a:tc>
+              </a:tr>
+              <a:tr h="283978">
+                <a:tc>
+                  <a:txBody>
+                    <a:bodyPr/>
+                    <a:lstStyle/>
+                    <a:p>
+                      <a:pPr algn="ctr"/>
+                      <a:r>
+                        <a:rPr kumimoji="1" lang="en-US" altLang="ja-JP" sz="900" dirty="0" smtClean="0"/>
+                        <a:t>3</a:t>
+                      </a:r>
+                    </a:p>
+                  </a:txBody>
+                  <a:tcPr marL="36000" marR="36000" marT="36000" marB="36000" anchor="ctr"/>
+                </a:tc>
+                <a:tc>
+                  <a:txBody>
+                    <a:bodyPr/>
+                    <a:lstStyle/>
+                    <a:p>
+                      <a:pPr algn="ctr"/>
+                      <a:r>
+                        <a:rPr kumimoji="1" lang="en-US" altLang="ja-JP" sz="900" dirty="0" smtClean="0"/>
+                        <a:t>180</a:t>
+                      </a:r>
+                      <a:endParaRPr kumimoji="1" lang="ja-JP" altLang="en-US" sz="900" dirty="0"/>
+                    </a:p>
+                  </a:txBody>
+                  <a:tcPr marL="36000" marR="36000" marT="36000" marB="36000" anchor="ctr"/>
+                </a:tc>
+                <a:tc>
+                  <a:txBody>
+                    <a:bodyPr/>
+                    <a:lstStyle/>
+                    <a:p>
+                      <a:pPr algn="ctr"/>
+                      <a:r>
+                        <a:rPr kumimoji="1" lang="en-US" altLang="ja-JP" sz="900" dirty="0" smtClean="0"/>
+                        <a:t>71.3</a:t>
+                      </a:r>
+                      <a:endParaRPr kumimoji="1" lang="ja-JP" altLang="en-US" sz="900" dirty="0"/>
+                    </a:p>
+                  </a:txBody>
+                  <a:tcPr marL="36000" marR="36000" marT="36000" marB="36000" anchor="ctr"/>
+                </a:tc>
+              </a:tr>
+            </a:tbl>
+          </a:graphicData>
+        </a:graphic>
+      </p:graphicFrame>
+      <p:sp>
+        <p:nvSpPr>
+          <p:cNvPr id="10" name="右矢印 9"/>
+          <p:cNvSpPr/>
+          <p:nvPr/>
+        </p:nvSpPr>
+        <p:spPr>
+          <a:xfrm>
+            <a:off x="8610600" y="4662745"/>
+            <a:ext cx="1233405" cy="479894"/>
+          </a:xfrm>
+          <a:prstGeom prst="rightArrow">
+            <a:avLst>
+              <a:gd name="adj1" fmla="val 100000"/>
+              <a:gd name="adj2" fmla="val 36463"/>
+            </a:avLst>
+          </a:prstGeom>
+          <a:solidFill>
+            <a:srgbClr val="92D050"/>
+          </a:solidFill>
+          <a:ln>
+            <a:noFill/>
+          </a:ln>
+        </p:spPr>
+        <p:style>
+          <a:lnRef idx="2">
+            <a:schemeClr val="accent1">
+              <a:shade val="50000"/>
+            </a:schemeClr>
+          </a:lnRef>
+          <a:fillRef idx="1">
+            <a:schemeClr val="accent1"/>
+          </a:fillRef>
+          <a:effectRef idx="0">
+            <a:schemeClr val="accent1"/>
+          </a:effectRef>
+          <a:fontRef idx="minor">
+            <a:schemeClr val="lt1"/>
+          </a:fontRef>
+        </p:style>
+        <p:txBody>
+          <a:bodyPr rtlCol="0" anchor="ctr"/>
+          <a:lstStyle/>
+          <a:p>
+            <a:pPr algn="ctr"/>
+            <a:r>
+              <a:rPr lang="en-US" altLang="ja-JP" sz="1000" dirty="0" err="1" smtClean="0">
+                <a:solidFill>
+                  <a:schemeClr val="tx1"/>
+                </a:solidFill>
+              </a:rPr>
+              <a:t>expand.grid</a:t>
+            </a:r>
+            <a:r>
+              <a:rPr lang="en-US" altLang="ja-JP" sz="1000" dirty="0" smtClean="0">
+                <a:solidFill>
+                  <a:schemeClr val="tx1"/>
+                </a:solidFill>
+              </a:rPr>
+              <a:t>(ID=1:3, TIME=0:2)</a:t>
+            </a:r>
+            <a:endParaRPr lang="en-US" altLang="ja-JP" sz="1000" dirty="0">
+              <a:solidFill>
+                <a:schemeClr val="tx1"/>
+              </a:solidFill>
+            </a:endParaRPr>
+          </a:p>
+        </p:txBody>
+      </p:sp>
+      <p:graphicFrame>
+        <p:nvGraphicFramePr>
+          <p:cNvPr id="11" name="表 10"/>
+          <p:cNvGraphicFramePr>
+            <a:graphicFrameLocks noGrp="1"/>
+          </p:cNvGraphicFramePr>
+          <p:nvPr>
+            <p:extLst>
+              <p:ext uri="{D42A27DB-BD31-4B8C-83A1-F6EECF244321}">
+                <p14:modId xmlns:p14="http://schemas.microsoft.com/office/powerpoint/2010/main" val="612145251"/>
+              </p:ext>
+            </p:extLst>
+          </p:nvPr>
+        </p:nvGraphicFramePr>
+        <p:xfrm>
+          <a:off x="9982200" y="3406543"/>
+          <a:ext cx="768642" cy="2839780"/>
+        </p:xfrm>
+        <a:graphic>
+          <a:graphicData uri="http://schemas.openxmlformats.org/drawingml/2006/table">
+            <a:tbl>
+              <a:tblPr firstRow="1" bandRow="1">
+                <a:tableStyleId>{5C22544A-7EE6-4342-B048-85BDC9FD1C3A}</a:tableStyleId>
+              </a:tblPr>
+              <a:tblGrid>
+                <a:gridCol w="384321"/>
+                <a:gridCol w="384321"/>
+              </a:tblGrid>
+              <a:tr h="283978">
+                <a:tc>
+                  <a:txBody>
+                    <a:bodyPr/>
+                    <a:lstStyle/>
+                    <a:p>
+                      <a:pPr algn="ctr"/>
+                      <a:r>
+                        <a:rPr kumimoji="1" lang="en-US" altLang="ja-JP" sz="900" dirty="0" smtClean="0"/>
+                        <a:t>ID</a:t>
+                      </a:r>
+                      <a:endParaRPr kumimoji="1" lang="ja-JP" altLang="en-US" sz="900" dirty="0"/>
+                    </a:p>
+                  </a:txBody>
+                  <a:tcPr marL="36000" marR="36000" marT="36000" marB="36000" anchor="ctr"/>
+                </a:tc>
+                <a:tc>
+                  <a:txBody>
+                    <a:bodyPr/>
+                    <a:lstStyle/>
+                    <a:p>
+                      <a:pPr algn="ctr"/>
+                      <a:r>
+                        <a:rPr kumimoji="1" lang="en-US" altLang="ja-JP" sz="900" dirty="0" smtClean="0"/>
+                        <a:t>TIME</a:t>
+                      </a:r>
+                      <a:endParaRPr kumimoji="1" lang="ja-JP" altLang="en-US" sz="900" dirty="0"/>
+                    </a:p>
+                  </a:txBody>
+                  <a:tcPr marL="36000" marR="36000" marT="36000" marB="36000" anchor="ctr"/>
+                </a:tc>
+              </a:tr>
+              <a:tr h="283978">
+                <a:tc>
+                  <a:txBody>
+                    <a:bodyPr/>
+                    <a:lstStyle/>
+                    <a:p>
+                      <a:pPr marL="0" algn="ctr" defTabSz="914400" rtl="0" eaLnBrk="1" latinLnBrk="0" hangingPunct="1"/>
+                      <a:r>
+                        <a:rPr kumimoji="1" lang="en-US" altLang="ja-JP" sz="900" kern="1200" dirty="0" smtClean="0"/>
+                        <a:t>1</a:t>
+                      </a:r>
+                      <a:endParaRPr kumimoji="1" lang="ja-JP" altLang="en-US" sz="900" kern="1200" dirty="0">
+                        <a:solidFill>
+                          <a:schemeClr val="dk1"/>
+                        </a:solidFill>
+                        <a:latin typeface="+mn-lt"/>
+                        <a:ea typeface="+mn-ea"/>
+                        <a:cs typeface="+mn-cs"/>
+                      </a:endParaRPr>
+                    </a:p>
+                  </a:txBody>
+                  <a:tcPr marL="36000" marR="36000" marT="36000" marB="36000" anchor="ctr"/>
+                </a:tc>
+                <a:tc>
+                  <a:txBody>
+                    <a:bodyPr/>
+                    <a:lstStyle/>
+                    <a:p>
+                      <a:pPr marL="0" algn="ctr" defTabSz="914400" rtl="0" eaLnBrk="1" latinLnBrk="0" hangingPunct="1"/>
+                      <a:r>
+                        <a:rPr kumimoji="1" lang="en-US" altLang="ja-JP" sz="900" kern="1200" dirty="0" smtClean="0"/>
+                        <a:t>0</a:t>
+                      </a:r>
+                      <a:endParaRPr kumimoji="1" lang="ja-JP" altLang="en-US" sz="900" kern="1200" dirty="0">
+                        <a:solidFill>
+                          <a:schemeClr val="dk1"/>
+                        </a:solidFill>
+                        <a:latin typeface="+mn-lt"/>
+                        <a:ea typeface="+mn-ea"/>
+                        <a:cs typeface="+mn-cs"/>
+                      </a:endParaRPr>
+                    </a:p>
+                  </a:txBody>
+                  <a:tcPr marL="36000" marR="36000" marT="36000" marB="36000" anchor="ctr"/>
+                </a:tc>
+              </a:tr>
+              <a:tr h="283978">
+                <a:tc>
+                  <a:txBody>
+                    <a:bodyPr/>
+                    <a:lstStyle/>
+                    <a:p>
+                      <a:pPr algn="ctr"/>
+                      <a:r>
+                        <a:rPr kumimoji="1" lang="en-US" altLang="ja-JP" sz="900" dirty="0" smtClean="0"/>
+                        <a:t>2</a:t>
+                      </a:r>
+                      <a:endParaRPr kumimoji="1" lang="ja-JP" altLang="en-US" sz="900" dirty="0"/>
+                    </a:p>
+                  </a:txBody>
+                  <a:tcPr marL="36000" marR="36000" marT="36000" marB="36000" anchor="ctr"/>
+                </a:tc>
+                <a:tc>
+                  <a:txBody>
+                    <a:bodyPr/>
+                    <a:lstStyle/>
+                    <a:p>
+                      <a:pPr algn="ctr"/>
+                      <a:r>
+                        <a:rPr kumimoji="1" lang="en-US" altLang="ja-JP" sz="900" dirty="0" smtClean="0"/>
+                        <a:t>0</a:t>
+                      </a:r>
+                      <a:endParaRPr kumimoji="1" lang="ja-JP" altLang="en-US" sz="900" dirty="0"/>
+                    </a:p>
+                  </a:txBody>
+                  <a:tcPr marL="36000" marR="36000" marT="36000" marB="36000" anchor="ctr"/>
+                </a:tc>
+              </a:tr>
+              <a:tr h="283978">
+                <a:tc>
+                  <a:txBody>
+                    <a:bodyPr/>
+                    <a:lstStyle/>
+                    <a:p>
+                      <a:pPr algn="ctr"/>
+                      <a:r>
+                        <a:rPr kumimoji="1" lang="en-US" altLang="ja-JP" sz="900" dirty="0" smtClean="0"/>
+                        <a:t>3</a:t>
+                      </a:r>
+                    </a:p>
+                  </a:txBody>
+                  <a:tcPr marL="36000" marR="36000" marT="36000" marB="36000" anchor="ctr"/>
+                </a:tc>
+                <a:tc>
+                  <a:txBody>
+                    <a:bodyPr/>
+                    <a:lstStyle/>
+                    <a:p>
+                      <a:pPr algn="ctr"/>
+                      <a:r>
+                        <a:rPr kumimoji="1" lang="en-US" altLang="ja-JP" sz="900" dirty="0" smtClean="0"/>
+                        <a:t>0</a:t>
+                      </a:r>
+                      <a:endParaRPr kumimoji="1" lang="ja-JP" altLang="en-US" sz="900" dirty="0"/>
+                    </a:p>
+                  </a:txBody>
+                  <a:tcPr marL="36000" marR="36000" marT="36000" marB="36000" anchor="ctr"/>
+                </a:tc>
+              </a:tr>
+              <a:tr h="283978">
+                <a:tc>
+                  <a:txBody>
+                    <a:bodyPr/>
+                    <a:lstStyle/>
+                    <a:p>
+                      <a:pPr algn="ctr"/>
+                      <a:r>
+                        <a:rPr kumimoji="1" lang="en-US" altLang="ja-JP" sz="900" dirty="0" smtClean="0"/>
+                        <a:t>1</a:t>
+                      </a:r>
+                      <a:endParaRPr kumimoji="1" lang="en-US" altLang="ja-JP" sz="900" dirty="0" smtClean="0"/>
+                    </a:p>
+                  </a:txBody>
+                  <a:tcPr marL="36000" marR="36000" marT="36000" marB="36000" anchor="ctr"/>
+                </a:tc>
+                <a:tc>
+                  <a:txBody>
+                    <a:bodyPr/>
+                    <a:lstStyle/>
+                    <a:p>
+                      <a:pPr algn="ctr"/>
+                      <a:r>
+                        <a:rPr kumimoji="1" lang="en-US" altLang="ja-JP" sz="900" dirty="0" smtClean="0"/>
+                        <a:t>1</a:t>
+                      </a:r>
+                      <a:endParaRPr kumimoji="1" lang="ja-JP" altLang="en-US" sz="900" dirty="0"/>
+                    </a:p>
+                  </a:txBody>
+                  <a:tcPr marL="36000" marR="36000" marT="36000" marB="36000" anchor="ctr"/>
+                </a:tc>
+              </a:tr>
+              <a:tr h="283978">
+                <a:tc>
+                  <a:txBody>
+                    <a:bodyPr/>
+                    <a:lstStyle/>
+                    <a:p>
+                      <a:pPr algn="ctr"/>
+                      <a:r>
+                        <a:rPr kumimoji="1" lang="en-US" altLang="ja-JP" sz="900" dirty="0" smtClean="0"/>
+                        <a:t>2</a:t>
+                      </a:r>
+                      <a:endParaRPr kumimoji="1" lang="en-US" altLang="ja-JP" sz="900" dirty="0" smtClean="0"/>
+                    </a:p>
+                  </a:txBody>
+                  <a:tcPr marL="36000" marR="36000" marT="36000" marB="36000" anchor="ctr"/>
+                </a:tc>
+                <a:tc>
+                  <a:txBody>
+                    <a:bodyPr/>
+                    <a:lstStyle/>
+                    <a:p>
+                      <a:pPr algn="ctr"/>
+                      <a:r>
+                        <a:rPr kumimoji="1" lang="en-US" altLang="ja-JP" sz="900" dirty="0" smtClean="0"/>
+                        <a:t>1</a:t>
+                      </a:r>
+                      <a:endParaRPr kumimoji="1" lang="ja-JP" altLang="en-US" sz="900" dirty="0"/>
+                    </a:p>
+                  </a:txBody>
+                  <a:tcPr marL="36000" marR="36000" marT="36000" marB="36000" anchor="ctr"/>
+                </a:tc>
+              </a:tr>
+              <a:tr h="283978">
+                <a:tc>
+                  <a:txBody>
+                    <a:bodyPr/>
+                    <a:lstStyle/>
+                    <a:p>
+                      <a:pPr algn="ctr"/>
+                      <a:r>
+                        <a:rPr kumimoji="1" lang="en-US" altLang="ja-JP" sz="900" dirty="0" smtClean="0"/>
+                        <a:t>3</a:t>
+                      </a:r>
+                      <a:endParaRPr kumimoji="1" lang="en-US" altLang="ja-JP" sz="900" dirty="0" smtClean="0"/>
+                    </a:p>
+                  </a:txBody>
+                  <a:tcPr marL="36000" marR="36000" marT="36000" marB="36000" anchor="ctr"/>
+                </a:tc>
+                <a:tc>
+                  <a:txBody>
+                    <a:bodyPr/>
+                    <a:lstStyle/>
+                    <a:p>
+                      <a:pPr algn="ctr"/>
+                      <a:r>
+                        <a:rPr kumimoji="1" lang="en-US" altLang="ja-JP" sz="900" dirty="0" smtClean="0"/>
+                        <a:t>1</a:t>
+                      </a:r>
+                      <a:endParaRPr kumimoji="1" lang="ja-JP" altLang="en-US" sz="900" dirty="0"/>
+                    </a:p>
+                  </a:txBody>
+                  <a:tcPr marL="36000" marR="36000" marT="36000" marB="36000" anchor="ctr"/>
+                </a:tc>
+              </a:tr>
+              <a:tr h="283978">
+                <a:tc>
+                  <a:txBody>
+                    <a:bodyPr/>
+                    <a:lstStyle/>
+                    <a:p>
+                      <a:pPr algn="ctr"/>
+                      <a:r>
+                        <a:rPr kumimoji="1" lang="en-US" altLang="ja-JP" sz="900" dirty="0" smtClean="0"/>
+                        <a:t>1</a:t>
+                      </a:r>
+                      <a:endParaRPr kumimoji="1" lang="en-US" altLang="ja-JP" sz="900" dirty="0" smtClean="0"/>
+                    </a:p>
+                  </a:txBody>
+                  <a:tcPr marL="36000" marR="36000" marT="36000" marB="36000" anchor="ctr"/>
+                </a:tc>
+                <a:tc>
+                  <a:txBody>
+                    <a:bodyPr/>
+                    <a:lstStyle/>
+                    <a:p>
+                      <a:pPr algn="ctr"/>
+                      <a:r>
+                        <a:rPr kumimoji="1" lang="en-US" altLang="ja-JP" sz="900" dirty="0" smtClean="0"/>
+                        <a:t>2</a:t>
+                      </a:r>
+                      <a:endParaRPr kumimoji="1" lang="ja-JP" altLang="en-US" sz="900" dirty="0"/>
+                    </a:p>
+                  </a:txBody>
+                  <a:tcPr marL="36000" marR="36000" marT="36000" marB="36000" anchor="ctr"/>
+                </a:tc>
+              </a:tr>
+              <a:tr h="283978">
+                <a:tc>
+                  <a:txBody>
+                    <a:bodyPr/>
+                    <a:lstStyle/>
+                    <a:p>
+                      <a:pPr algn="ctr"/>
+                      <a:r>
+                        <a:rPr kumimoji="1" lang="en-US" altLang="ja-JP" sz="900" dirty="0" smtClean="0"/>
+                        <a:t>2</a:t>
+                      </a:r>
+                      <a:endParaRPr kumimoji="1" lang="en-US" altLang="ja-JP" sz="900" dirty="0" smtClean="0"/>
+                    </a:p>
+                  </a:txBody>
+                  <a:tcPr marL="36000" marR="36000" marT="36000" marB="36000" anchor="ctr"/>
+                </a:tc>
+                <a:tc>
+                  <a:txBody>
+                    <a:bodyPr/>
+                    <a:lstStyle/>
+                    <a:p>
+                      <a:pPr algn="ctr"/>
+                      <a:r>
+                        <a:rPr kumimoji="1" lang="en-US" altLang="ja-JP" sz="900" dirty="0" smtClean="0"/>
+                        <a:t>2</a:t>
+                      </a:r>
+                      <a:endParaRPr kumimoji="1" lang="ja-JP" altLang="en-US" sz="900" dirty="0"/>
+                    </a:p>
+                  </a:txBody>
+                  <a:tcPr marL="36000" marR="36000" marT="36000" marB="36000" anchor="ctr"/>
+                </a:tc>
+              </a:tr>
+              <a:tr h="283978">
+                <a:tc>
+                  <a:txBody>
+                    <a:bodyPr/>
+                    <a:lstStyle/>
+                    <a:p>
+                      <a:pPr algn="ctr"/>
+                      <a:r>
+                        <a:rPr kumimoji="1" lang="en-US" altLang="ja-JP" sz="900" dirty="0" smtClean="0"/>
+                        <a:t>3</a:t>
+                      </a:r>
+                      <a:endParaRPr kumimoji="1" lang="en-US" altLang="ja-JP" sz="900" dirty="0" smtClean="0"/>
+                    </a:p>
+                  </a:txBody>
+                  <a:tcPr marL="36000" marR="36000" marT="36000" marB="36000" anchor="ctr"/>
+                </a:tc>
+                <a:tc>
+                  <a:txBody>
+                    <a:bodyPr/>
+                    <a:lstStyle/>
+                    <a:p>
+                      <a:pPr algn="ctr"/>
+                      <a:r>
+                        <a:rPr kumimoji="1" lang="en-US" altLang="ja-JP" sz="900" dirty="0" smtClean="0"/>
+                        <a:t>2</a:t>
+                      </a:r>
+                      <a:endParaRPr kumimoji="1" lang="ja-JP" altLang="en-US" sz="900" dirty="0"/>
+                    </a:p>
+                  </a:txBody>
+                  <a:tcPr marL="36000" marR="36000" marT="36000" marB="36000" anchor="ctr"/>
+                </a:tc>
+              </a:tr>
+            </a:tbl>
+          </a:graphicData>
+        </a:graphic>
+      </p:graphicFrame>
     </p:spTree>
     <p:extLst>
       <p:ext uri="{BB962C8B-B14F-4D97-AF65-F5344CB8AC3E}">
@@ -8153,9 +9898,491 @@
   <p:timing>
     <p:tnLst>
       <p:par>
-        <p:cTn id="1" dur="indefinite" restart="never" nodeType="tmRoot"/>
+        <p:cTn id="1" dur="indefinite" restart="never" nodeType="tmRoot">
+          <p:childTnLst>
+            <p:seq concurrent="1" nextAc="seek">
+              <p:cTn id="2" dur="indefinite" nodeType="mainSeq">
+                <p:childTnLst>
+                  <p:par>
+                    <p:cTn id="3" fill="hold">
+                      <p:stCondLst>
+                        <p:cond delay="indefinite"/>
+                      </p:stCondLst>
+                      <p:childTnLst>
+                        <p:par>
+                          <p:cTn id="4" fill="hold">
+                            <p:stCondLst>
+                              <p:cond delay="0"/>
+                            </p:stCondLst>
+                            <p:childTnLst>
+                              <p:par>
+                                <p:cTn id="5" presetID="1" presetClass="entr" presetSubtype="0" fill="hold" nodeType="clickEffect">
+                                  <p:stCondLst>
+                                    <p:cond delay="0"/>
+                                  </p:stCondLst>
+                                  <p:childTnLst>
+                                    <p:set>
+                                      <p:cBhvr>
+                                        <p:cTn id="6" dur="1" fill="hold">
+                                          <p:stCondLst>
+                                            <p:cond delay="0"/>
+                                          </p:stCondLst>
+                                        </p:cTn>
+                                        <p:tgtEl>
+                                          <p:spTgt spid="7"/>
+                                        </p:tgtEl>
+                                        <p:attrNameLst>
+                                          <p:attrName>style.visibility</p:attrName>
+                                        </p:attrNameLst>
+                                      </p:cBhvr>
+                                      <p:to>
+                                        <p:strVal val="visible"/>
+                                      </p:to>
+                                    </p:set>
+                                  </p:childTnLst>
+                                </p:cTn>
+                              </p:par>
+                              <p:par>
+                                <p:cTn id="7" presetID="1" presetClass="entr" presetSubtype="0" fill="hold" grpId="0" nodeType="withEffect">
+                                  <p:stCondLst>
+                                    <p:cond delay="0"/>
+                                  </p:stCondLst>
+                                  <p:childTnLst>
+                                    <p:set>
+                                      <p:cBhvr>
+                                        <p:cTn id="8" dur="1" fill="hold">
+                                          <p:stCondLst>
+                                            <p:cond delay="0"/>
+                                          </p:stCondLst>
+                                        </p:cTn>
+                                        <p:tgtEl>
+                                          <p:spTgt spid="8"/>
+                                        </p:tgtEl>
+                                        <p:attrNameLst>
+                                          <p:attrName>style.visibility</p:attrName>
+                                        </p:attrNameLst>
+                                      </p:cBhvr>
+                                      <p:to>
+                                        <p:strVal val="visible"/>
+                                      </p:to>
+                                    </p:set>
+                                  </p:childTnLst>
+                                </p:cTn>
+                              </p:par>
+                              <p:par>
+                                <p:cTn id="9" presetID="1" presetClass="entr" presetSubtype="0" fill="hold" nodeType="withEffect">
+                                  <p:stCondLst>
+                                    <p:cond delay="0"/>
+                                  </p:stCondLst>
+                                  <p:childTnLst>
+                                    <p:set>
+                                      <p:cBhvr>
+                                        <p:cTn id="10" dur="1" fill="hold">
+                                          <p:stCondLst>
+                                            <p:cond delay="0"/>
+                                          </p:stCondLst>
+                                        </p:cTn>
+                                        <p:tgtEl>
+                                          <p:spTgt spid="9"/>
+                                        </p:tgtEl>
+                                        <p:attrNameLst>
+                                          <p:attrName>style.visibility</p:attrName>
+                                        </p:attrNameLst>
+                                      </p:cBhvr>
+                                      <p:to>
+                                        <p:strVal val="visible"/>
+                                      </p:to>
+                                    </p:set>
+                                  </p:childTnLst>
+                                </p:cTn>
+                              </p:par>
+                            </p:childTnLst>
+                          </p:cTn>
+                        </p:par>
+                      </p:childTnLst>
+                    </p:cTn>
+                  </p:par>
+                  <p:par>
+                    <p:cTn id="11" fill="hold">
+                      <p:stCondLst>
+                        <p:cond delay="indefinite"/>
+                      </p:stCondLst>
+                      <p:childTnLst>
+                        <p:par>
+                          <p:cTn id="12" fill="hold">
+                            <p:stCondLst>
+                              <p:cond delay="0"/>
+                            </p:stCondLst>
+                            <p:childTnLst>
+                              <p:par>
+                                <p:cTn id="13" presetID="1" presetClass="entr" presetSubtype="0" fill="hold" nodeType="clickEffect">
+                                  <p:stCondLst>
+                                    <p:cond delay="0"/>
+                                  </p:stCondLst>
+                                  <p:childTnLst>
+                                    <p:set>
+                                      <p:cBhvr>
+                                        <p:cTn id="14" dur="1" fill="hold">
+                                          <p:stCondLst>
+                                            <p:cond delay="0"/>
+                                          </p:stCondLst>
+                                        </p:cTn>
+                                        <p:tgtEl>
+                                          <p:spTgt spid="6">
+                                            <p:txEl>
+                                              <p:pRg st="5" end="5"/>
+                                            </p:txEl>
+                                          </p:spTgt>
+                                        </p:tgtEl>
+                                        <p:attrNameLst>
+                                          <p:attrName>style.visibility</p:attrName>
+                                        </p:attrNameLst>
+                                      </p:cBhvr>
+                                      <p:to>
+                                        <p:strVal val="visible"/>
+                                      </p:to>
+                                    </p:set>
+                                  </p:childTnLst>
+                                </p:cTn>
+                              </p:par>
+                              <p:par>
+                                <p:cTn id="15" presetID="1" presetClass="entr" presetSubtype="0" fill="hold" nodeType="withEffect">
+                                  <p:stCondLst>
+                                    <p:cond delay="0"/>
+                                  </p:stCondLst>
+                                  <p:childTnLst>
+                                    <p:set>
+                                      <p:cBhvr>
+                                        <p:cTn id="16" dur="1" fill="hold">
+                                          <p:stCondLst>
+                                            <p:cond delay="0"/>
+                                          </p:stCondLst>
+                                        </p:cTn>
+                                        <p:tgtEl>
+                                          <p:spTgt spid="6">
+                                            <p:txEl>
+                                              <p:pRg st="6" end="6"/>
+                                            </p:txEl>
+                                          </p:spTgt>
+                                        </p:tgtEl>
+                                        <p:attrNameLst>
+                                          <p:attrName>style.visibility</p:attrName>
+                                        </p:attrNameLst>
+                                      </p:cBhvr>
+                                      <p:to>
+                                        <p:strVal val="visible"/>
+                                      </p:to>
+                                    </p:set>
+                                  </p:childTnLst>
+                                </p:cTn>
+                              </p:par>
+                              <p:par>
+                                <p:cTn id="17" presetID="1" presetClass="entr" presetSubtype="0" fill="hold" nodeType="withEffect">
+                                  <p:stCondLst>
+                                    <p:cond delay="0"/>
+                                  </p:stCondLst>
+                                  <p:childTnLst>
+                                    <p:set>
+                                      <p:cBhvr>
+                                        <p:cTn id="18" dur="1" fill="hold">
+                                          <p:stCondLst>
+                                            <p:cond delay="0"/>
+                                          </p:stCondLst>
+                                        </p:cTn>
+                                        <p:tgtEl>
+                                          <p:spTgt spid="6">
+                                            <p:txEl>
+                                              <p:pRg st="7" end="7"/>
+                                            </p:txEl>
+                                          </p:spTgt>
+                                        </p:tgtEl>
+                                        <p:attrNameLst>
+                                          <p:attrName>style.visibility</p:attrName>
+                                        </p:attrNameLst>
+                                      </p:cBhvr>
+                                      <p:to>
+                                        <p:strVal val="visible"/>
+                                      </p:to>
+                                    </p:set>
+                                  </p:childTnLst>
+                                </p:cTn>
+                              </p:par>
+                            </p:childTnLst>
+                          </p:cTn>
+                        </p:par>
+                      </p:childTnLst>
+                    </p:cTn>
+                  </p:par>
+                  <p:par>
+                    <p:cTn id="19" fill="hold">
+                      <p:stCondLst>
+                        <p:cond delay="indefinite"/>
+                      </p:stCondLst>
+                      <p:childTnLst>
+                        <p:par>
+                          <p:cTn id="20" fill="hold">
+                            <p:stCondLst>
+                              <p:cond delay="0"/>
+                            </p:stCondLst>
+                            <p:childTnLst>
+                              <p:par>
+                                <p:cTn id="21" presetID="1" presetClass="entr" presetSubtype="0" fill="hold" grpId="0" nodeType="clickEffect">
+                                  <p:stCondLst>
+                                    <p:cond delay="0"/>
+                                  </p:stCondLst>
+                                  <p:childTnLst>
+                                    <p:set>
+                                      <p:cBhvr>
+                                        <p:cTn id="22" dur="1" fill="hold">
+                                          <p:stCondLst>
+                                            <p:cond delay="0"/>
+                                          </p:stCondLst>
+                                        </p:cTn>
+                                        <p:tgtEl>
+                                          <p:spTgt spid="10"/>
+                                        </p:tgtEl>
+                                        <p:attrNameLst>
+                                          <p:attrName>style.visibility</p:attrName>
+                                        </p:attrNameLst>
+                                      </p:cBhvr>
+                                      <p:to>
+                                        <p:strVal val="visible"/>
+                                      </p:to>
+                                    </p:set>
+                                  </p:childTnLst>
+                                </p:cTn>
+                              </p:par>
+                              <p:par>
+                                <p:cTn id="23" presetID="1" presetClass="entr" presetSubtype="0" fill="hold" nodeType="withEffect">
+                                  <p:stCondLst>
+                                    <p:cond delay="0"/>
+                                  </p:stCondLst>
+                                  <p:childTnLst>
+                                    <p:set>
+                                      <p:cBhvr>
+                                        <p:cTn id="24" dur="1" fill="hold">
+                                          <p:stCondLst>
+                                            <p:cond delay="0"/>
+                                          </p:stCondLst>
+                                        </p:cTn>
+                                        <p:tgtEl>
+                                          <p:spTgt spid="11"/>
+                                        </p:tgtEl>
+                                        <p:attrNameLst>
+                                          <p:attrName>style.visibility</p:attrName>
+                                        </p:attrNameLst>
+                                      </p:cBhvr>
+                                      <p:to>
+                                        <p:strVal val="visible"/>
+                                      </p:to>
+                                    </p:set>
+                                  </p:childTnLst>
+                                </p:cTn>
+                              </p:par>
+                            </p:childTnLst>
+                          </p:cTn>
+                        </p:par>
+                      </p:childTnLst>
+                    </p:cTn>
+                  </p:par>
+                  <p:par>
+                    <p:cTn id="25" fill="hold">
+                      <p:stCondLst>
+                        <p:cond delay="indefinite"/>
+                      </p:stCondLst>
+                      <p:childTnLst>
+                        <p:par>
+                          <p:cTn id="26" fill="hold">
+                            <p:stCondLst>
+                              <p:cond delay="0"/>
+                            </p:stCondLst>
+                            <p:childTnLst>
+                              <p:par>
+                                <p:cTn id="27" presetID="1" presetClass="entr" presetSubtype="0" fill="hold" nodeType="clickEffect">
+                                  <p:stCondLst>
+                                    <p:cond delay="0"/>
+                                  </p:stCondLst>
+                                  <p:childTnLst>
+                                    <p:set>
+                                      <p:cBhvr>
+                                        <p:cTn id="28" dur="1" fill="hold">
+                                          <p:stCondLst>
+                                            <p:cond delay="0"/>
+                                          </p:stCondLst>
+                                        </p:cTn>
+                                        <p:tgtEl>
+                                          <p:spTgt spid="6">
+                                            <p:txEl>
+                                              <p:pRg st="8" end="8"/>
+                                            </p:txEl>
+                                          </p:spTgt>
+                                        </p:tgtEl>
+                                        <p:attrNameLst>
+                                          <p:attrName>style.visibility</p:attrName>
+                                        </p:attrNameLst>
+                                      </p:cBhvr>
+                                      <p:to>
+                                        <p:strVal val="visible"/>
+                                      </p:to>
+                                    </p:set>
+                                  </p:childTnLst>
+                                </p:cTn>
+                              </p:par>
+                              <p:par>
+                                <p:cTn id="29" presetID="1" presetClass="entr" presetSubtype="0" fill="hold" nodeType="withEffect">
+                                  <p:stCondLst>
+                                    <p:cond delay="0"/>
+                                  </p:stCondLst>
+                                  <p:childTnLst>
+                                    <p:set>
+                                      <p:cBhvr>
+                                        <p:cTn id="30" dur="1" fill="hold">
+                                          <p:stCondLst>
+                                            <p:cond delay="0"/>
+                                          </p:stCondLst>
+                                        </p:cTn>
+                                        <p:tgtEl>
+                                          <p:spTgt spid="6">
+                                            <p:txEl>
+                                              <p:pRg st="9" end="9"/>
+                                            </p:txEl>
+                                          </p:spTgt>
+                                        </p:tgtEl>
+                                        <p:attrNameLst>
+                                          <p:attrName>style.visibility</p:attrName>
+                                        </p:attrNameLst>
+                                      </p:cBhvr>
+                                      <p:to>
+                                        <p:strVal val="visible"/>
+                                      </p:to>
+                                    </p:set>
+                                  </p:childTnLst>
+                                </p:cTn>
+                              </p:par>
+                              <p:par>
+                                <p:cTn id="31" presetID="1" presetClass="entr" presetSubtype="0" fill="hold" nodeType="withEffect">
+                                  <p:stCondLst>
+                                    <p:cond delay="0"/>
+                                  </p:stCondLst>
+                                  <p:childTnLst>
+                                    <p:set>
+                                      <p:cBhvr>
+                                        <p:cTn id="32" dur="1" fill="hold">
+                                          <p:stCondLst>
+                                            <p:cond delay="0"/>
+                                          </p:stCondLst>
+                                        </p:cTn>
+                                        <p:tgtEl>
+                                          <p:spTgt spid="6">
+                                            <p:txEl>
+                                              <p:pRg st="10" end="10"/>
+                                            </p:txEl>
+                                          </p:spTgt>
+                                        </p:tgtEl>
+                                        <p:attrNameLst>
+                                          <p:attrName>style.visibility</p:attrName>
+                                        </p:attrNameLst>
+                                      </p:cBhvr>
+                                      <p:to>
+                                        <p:strVal val="visible"/>
+                                      </p:to>
+                                    </p:set>
+                                  </p:childTnLst>
+                                </p:cTn>
+                              </p:par>
+                              <p:par>
+                                <p:cTn id="33" presetID="1" presetClass="entr" presetSubtype="0" fill="hold" nodeType="withEffect">
+                                  <p:stCondLst>
+                                    <p:cond delay="0"/>
+                                  </p:stCondLst>
+                                  <p:childTnLst>
+                                    <p:set>
+                                      <p:cBhvr>
+                                        <p:cTn id="34" dur="1" fill="hold">
+                                          <p:stCondLst>
+                                            <p:cond delay="0"/>
+                                          </p:stCondLst>
+                                        </p:cTn>
+                                        <p:tgtEl>
+                                          <p:spTgt spid="6">
+                                            <p:txEl>
+                                              <p:pRg st="11" end="11"/>
+                                            </p:txEl>
+                                          </p:spTgt>
+                                        </p:tgtEl>
+                                        <p:attrNameLst>
+                                          <p:attrName>style.visibility</p:attrName>
+                                        </p:attrNameLst>
+                                      </p:cBhvr>
+                                      <p:to>
+                                        <p:strVal val="visible"/>
+                                      </p:to>
+                                    </p:set>
+                                  </p:childTnLst>
+                                </p:cTn>
+                              </p:par>
+                              <p:par>
+                                <p:cTn id="35" presetID="1" presetClass="entr" presetSubtype="0" fill="hold" nodeType="withEffect">
+                                  <p:stCondLst>
+                                    <p:cond delay="0"/>
+                                  </p:stCondLst>
+                                  <p:childTnLst>
+                                    <p:set>
+                                      <p:cBhvr>
+                                        <p:cTn id="36" dur="1" fill="hold">
+                                          <p:stCondLst>
+                                            <p:cond delay="0"/>
+                                          </p:stCondLst>
+                                        </p:cTn>
+                                        <p:tgtEl>
+                                          <p:spTgt spid="6">
+                                            <p:txEl>
+                                              <p:pRg st="12" end="12"/>
+                                            </p:txEl>
+                                          </p:spTgt>
+                                        </p:tgtEl>
+                                        <p:attrNameLst>
+                                          <p:attrName>style.visibility</p:attrName>
+                                        </p:attrNameLst>
+                                      </p:cBhvr>
+                                      <p:to>
+                                        <p:strVal val="visible"/>
+                                      </p:to>
+                                    </p:set>
+                                  </p:childTnLst>
+                                </p:cTn>
+                              </p:par>
+                            </p:childTnLst>
+                          </p:cTn>
+                        </p:par>
+                      </p:childTnLst>
+                    </p:cTn>
+                  </p:par>
+                </p:childTnLst>
+              </p:cTn>
+              <p:prevCondLst>
+                <p:cond evt="onPrev" delay="0">
+                  <p:tgtEl>
+                    <p:sldTgt/>
+                  </p:tgtEl>
+                </p:cond>
+              </p:prevCondLst>
+              <p:nextCondLst>
+                <p:cond evt="onNext" delay="0">
+                  <p:tgtEl>
+                    <p:sldTgt/>
+                  </p:tgtEl>
+                </p:cond>
+              </p:nextCondLst>
+            </p:seq>
+          </p:childTnLst>
+        </p:cTn>
       </p:par>
     </p:tnLst>
+    <p:bldLst>
+      <p:bldP spid="8" grpId="0" animBg="1"/>
+      <p:bldP spid="10" grpId="0" animBg="1"/>
+    </p:bldLst>
   </p:timing>
 </p:sld>
 </file>
@@ -8233,7 +10460,134 @@
           <a:bodyPr/>
           <a:lstStyle/>
           <a:p>
-            <a:endParaRPr kumimoji="1" lang="ja-JP" altLang="en-US"/>
+            <a:pPr marL="0" indent="0">
+              <a:buNone/>
+            </a:pPr>
+            <a:r>
+              <a:rPr lang="en-US" altLang="ja-JP" dirty="0"/>
+              <a:t>data folder</a:t>
+            </a:r>
+            <a:r>
+              <a:rPr lang="ja-JP" altLang="en-US" dirty="0"/>
+              <a:t>内の</a:t>
+            </a:r>
+            <a:r>
+              <a:rPr lang="en-US" altLang="ja-JP" dirty="0">
+                <a:solidFill>
+                  <a:schemeClr val="accent6">
+                    <a:lumMod val="75000"/>
+                  </a:schemeClr>
+                </a:solidFill>
+              </a:rPr>
+              <a:t>PSP4-8-748-s012.csv</a:t>
+            </a:r>
+            <a:r>
+              <a:rPr lang="ja-JP" altLang="en-US" dirty="0"/>
+              <a:t>を</a:t>
+            </a:r>
+            <a:r>
+              <a:rPr lang="en-US" altLang="ja-JP" dirty="0" smtClean="0"/>
+              <a:t>nm_data2, </a:t>
+            </a:r>
+            <a:r>
+              <a:rPr lang="en-US" altLang="ja-JP" dirty="0" smtClean="0">
+                <a:solidFill>
+                  <a:schemeClr val="accent6">
+                    <a:lumMod val="75000"/>
+                  </a:schemeClr>
+                </a:solidFill>
+              </a:rPr>
+              <a:t>back_info.csv</a:t>
+            </a:r>
+            <a:r>
+              <a:rPr lang="ja-JP" altLang="en-US" dirty="0" smtClean="0"/>
+              <a:t>を</a:t>
+            </a:r>
+            <a:r>
+              <a:rPr lang="en-US" altLang="ja-JP" dirty="0" err="1" smtClean="0"/>
+              <a:t>back_info</a:t>
+            </a:r>
+            <a:r>
+              <a:rPr lang="ja-JP" altLang="en-US" dirty="0" smtClean="0"/>
+              <a:t>と</a:t>
+            </a:r>
+            <a:r>
+              <a:rPr lang="ja-JP" altLang="en-US" dirty="0"/>
+              <a:t>して読み込み</a:t>
+            </a:r>
+            <a:r>
+              <a:rPr lang="ja-JP" altLang="en-US" dirty="0" smtClean="0"/>
+              <a:t>，</a:t>
+            </a:r>
+            <a:endParaRPr lang="en-US" altLang="ja-JP" dirty="0" smtClean="0"/>
+          </a:p>
+          <a:p>
+            <a:pPr marL="971550" lvl="1" indent="-514350">
+              <a:buFont typeface="+mj-lt"/>
+              <a:buAutoNum type="arabicPeriod"/>
+            </a:pPr>
+            <a:r>
+              <a:rPr lang="en-US" altLang="ja-JP" dirty="0" smtClean="0"/>
+              <a:t>nm_data2</a:t>
+            </a:r>
+            <a:r>
+              <a:rPr lang="ja-JP" altLang="en-US" dirty="0" smtClean="0"/>
+              <a:t>に</a:t>
+            </a:r>
+            <a:r>
+              <a:rPr lang="en-US" altLang="ja-JP" dirty="0" err="1" smtClean="0"/>
+              <a:t>back_info</a:t>
+            </a:r>
+            <a:r>
+              <a:rPr lang="ja-JP" altLang="en-US" dirty="0" smtClean="0"/>
+              <a:t>を</a:t>
+            </a:r>
+            <a:r>
+              <a:rPr lang="en-US" altLang="ja-JP" dirty="0" smtClean="0"/>
+              <a:t>ID</a:t>
+            </a:r>
+            <a:r>
+              <a:rPr lang="ja-JP" altLang="en-US" dirty="0" smtClean="0"/>
+              <a:t>を</a:t>
+            </a:r>
+            <a:r>
+              <a:rPr lang="en-US" altLang="ja-JP" dirty="0" smtClean="0"/>
+              <a:t>Key</a:t>
+            </a:r>
+            <a:r>
+              <a:rPr lang="ja-JP" altLang="en-US" dirty="0" smtClean="0"/>
+              <a:t>としてマージしてください</a:t>
+            </a:r>
+            <a:endParaRPr lang="en-US" altLang="ja-JP" dirty="0" smtClean="0"/>
+          </a:p>
+          <a:p>
+            <a:pPr marL="971550" lvl="1" indent="-514350">
+              <a:buFont typeface="+mj-lt"/>
+              <a:buAutoNum type="arabicPeriod"/>
+            </a:pPr>
+            <a:r>
+              <a:rPr lang="en-US" altLang="ja-JP" dirty="0" smtClean="0"/>
+              <a:t>CYP2D6</a:t>
+            </a:r>
+            <a:r>
+              <a:rPr lang="ja-JP" altLang="en-US" dirty="0" smtClean="0"/>
+              <a:t> </a:t>
+            </a:r>
+            <a:r>
+              <a:rPr lang="en-US" altLang="ja-JP" dirty="0" smtClean="0"/>
+              <a:t>Phenotype</a:t>
+            </a:r>
+            <a:r>
+              <a:rPr lang="ja-JP" altLang="en-US" dirty="0" smtClean="0"/>
+              <a:t>ごとの被験者数を算出してください</a:t>
+            </a:r>
+            <a:endParaRPr lang="en-US" altLang="ja-JP" dirty="0"/>
+          </a:p>
+          <a:p>
+            <a:pPr marL="0" indent="0">
+              <a:buNone/>
+            </a:pPr>
+            <a:endParaRPr kumimoji="1" lang="ja-JP" altLang="en-US" dirty="0"/>
           </a:p>
         </p:txBody>
       </p:sp>
@@ -8309,6 +10663,13 @@
   <p:clrMapOvr>
     <a:masterClrMapping/>
   </p:clrMapOvr>
+  <p:timing>
+    <p:tnLst>
+      <p:par>
+        <p:cTn id="1" dur="indefinite" restart="never" nodeType="tmRoot"/>
+      </p:par>
+    </p:tnLst>
+  </p:timing>
 </p:sld>
 </file>
 
@@ -8735,6 +11096,13 @@
   <p:clrMapOvr>
     <a:masterClrMapping/>
   </p:clrMapOvr>
+  <p:timing>
+    <p:tnLst>
+      <p:par>
+        <p:cTn id="1" dur="indefinite" restart="never" nodeType="tmRoot"/>
+      </p:par>
+    </p:tnLst>
+  </p:timing>
 </p:sld>
 </file>
 
@@ -9510,11 +11878,7 @@
             </a:r>
             <a:r>
               <a:rPr lang="ja-JP" altLang="en-US" dirty="0" smtClean="0"/>
-              <a:t>：</a:t>
-            </a:r>
-            <a:r>
-              <a:rPr lang="ja-JP" altLang="en-US" dirty="0" smtClean="0"/>
-              <a:t>データの読み込み，表示，計測，抜き出し，</a:t>
+              <a:t>：データの読み込み，表示，計測，抜き出し，</a:t>
             </a:r>
             <a:r>
               <a:rPr lang="ja-JP" altLang="en-US" dirty="0"/>
@@ -9598,11 +11962,7 @@
             </a:r>
             <a:r>
               <a:rPr lang="ja-JP" altLang="en-US" dirty="0" smtClean="0"/>
-              <a:t>：</a:t>
-            </a:r>
-            <a:r>
-              <a:rPr lang="ja-JP" altLang="en-US" dirty="0" smtClean="0"/>
-              <a:t>散布図，折れ線グラフ</a:t>
+              <a:t>：散布図，折れ線グラフ</a:t>
             </a:r>
             <a:r>
               <a:rPr lang="en-US" altLang="ja-JP" dirty="0" smtClean="0"/>
@@ -10836,7 +13196,141 @@
   <p:timing>
     <p:tnLst>
       <p:par>
-        <p:cTn id="1" dur="indefinite" restart="never" nodeType="tmRoot"/>
+        <p:cTn id="1" dur="indefinite" restart="never" nodeType="tmRoot">
+          <p:childTnLst>
+            <p:seq concurrent="1" nextAc="seek">
+              <p:cTn id="2" dur="indefinite" nodeType="mainSeq">
+                <p:childTnLst>
+                  <p:par>
+                    <p:cTn id="3" fill="hold">
+                      <p:stCondLst>
+                        <p:cond delay="indefinite"/>
+                      </p:stCondLst>
+                      <p:childTnLst>
+                        <p:par>
+                          <p:cTn id="4" fill="hold">
+                            <p:stCondLst>
+                              <p:cond delay="0"/>
+                            </p:stCondLst>
+                            <p:childTnLst>
+                              <p:par>
+                                <p:cTn id="5" presetID="1" presetClass="entr" presetSubtype="0" fill="hold" nodeType="clickEffect">
+                                  <p:stCondLst>
+                                    <p:cond delay="0"/>
+                                  </p:stCondLst>
+                                  <p:childTnLst>
+                                    <p:set>
+                                      <p:cBhvr>
+                                        <p:cTn id="6" dur="1" fill="hold">
+                                          <p:stCondLst>
+                                            <p:cond delay="0"/>
+                                          </p:stCondLst>
+                                        </p:cTn>
+                                        <p:tgtEl>
+                                          <p:spTgt spid="3">
+                                            <p:txEl>
+                                              <p:pRg st="4" end="4"/>
+                                            </p:txEl>
+                                          </p:spTgt>
+                                        </p:tgtEl>
+                                        <p:attrNameLst>
+                                          <p:attrName>style.visibility</p:attrName>
+                                        </p:attrNameLst>
+                                      </p:cBhvr>
+                                      <p:to>
+                                        <p:strVal val="visible"/>
+                                      </p:to>
+                                    </p:set>
+                                  </p:childTnLst>
+                                </p:cTn>
+                              </p:par>
+                              <p:par>
+                                <p:cTn id="7" presetID="1" presetClass="entr" presetSubtype="0" fill="hold" nodeType="withEffect">
+                                  <p:stCondLst>
+                                    <p:cond delay="0"/>
+                                  </p:stCondLst>
+                                  <p:childTnLst>
+                                    <p:set>
+                                      <p:cBhvr>
+                                        <p:cTn id="8" dur="1" fill="hold">
+                                          <p:stCondLst>
+                                            <p:cond delay="0"/>
+                                          </p:stCondLst>
+                                        </p:cTn>
+                                        <p:tgtEl>
+                                          <p:spTgt spid="3">
+                                            <p:txEl>
+                                              <p:pRg st="5" end="5"/>
+                                            </p:txEl>
+                                          </p:spTgt>
+                                        </p:tgtEl>
+                                        <p:attrNameLst>
+                                          <p:attrName>style.visibility</p:attrName>
+                                        </p:attrNameLst>
+                                      </p:cBhvr>
+                                      <p:to>
+                                        <p:strVal val="visible"/>
+                                      </p:to>
+                                    </p:set>
+                                  </p:childTnLst>
+                                </p:cTn>
+                              </p:par>
+                              <p:par>
+                                <p:cTn id="9" presetID="1" presetClass="entr" presetSubtype="0" fill="hold" nodeType="withEffect">
+                                  <p:stCondLst>
+                                    <p:cond delay="0"/>
+                                  </p:stCondLst>
+                                  <p:childTnLst>
+                                    <p:set>
+                                      <p:cBhvr>
+                                        <p:cTn id="10" dur="1" fill="hold">
+                                          <p:stCondLst>
+                                            <p:cond delay="0"/>
+                                          </p:stCondLst>
+                                        </p:cTn>
+                                        <p:tgtEl>
+                                          <p:spTgt spid="3">
+                                            <p:txEl>
+                                              <p:pRg st="6" end="6"/>
+                                            </p:txEl>
+                                          </p:spTgt>
+                                        </p:tgtEl>
+                                        <p:attrNameLst>
+                                          <p:attrName>style.visibility</p:attrName>
+                                        </p:attrNameLst>
+                                      </p:cBhvr>
+                                      <p:to>
+                                        <p:strVal val="visible"/>
+                                      </p:to>
+                                    </p:set>
+                                  </p:childTnLst>
+                                </p:cTn>
+                              </p:par>
+                            </p:childTnLst>
+                          </p:cTn>
+                        </p:par>
+                      </p:childTnLst>
+                    </p:cTn>
+                  </p:par>
+                </p:childTnLst>
+              </p:cTn>
+              <p:prevCondLst>
+                <p:cond evt="onPrev" delay="0">
+                  <p:tgtEl>
+                    <p:sldTgt/>
+                  </p:tgtEl>
+                </p:cond>
+              </p:prevCondLst>
+              <p:nextCondLst>
+                <p:cond evt="onNext" delay="0">
+                  <p:tgtEl>
+                    <p:sldTgt/>
+                  </p:tgtEl>
+                </p:cond>
+              </p:nextCondLst>
+            </p:seq>
+          </p:childTnLst>
+        </p:cTn>
       </p:par>
     </p:tnLst>
   </p:timing>
@@ -17862,9 +20356,135 @@
   <p:timing>
     <p:tnLst>
       <p:par>
-        <p:cTn id="1" dur="indefinite" restart="never" nodeType="tmRoot"/>
+        <p:cTn id="1" dur="indefinite" restart="never" nodeType="tmRoot">
+          <p:childTnLst>
+            <p:seq concurrent="1" nextAc="seek">
+              <p:cTn id="2" dur="indefinite" nodeType="mainSeq">
+                <p:childTnLst>
+                  <p:par>
+                    <p:cTn id="3" fill="hold">
+                      <p:stCondLst>
+                        <p:cond delay="indefinite"/>
+                      </p:stCondLst>
+                      <p:childTnLst>
+                        <p:par>
+                          <p:cTn id="4" fill="hold">
+                            <p:stCondLst>
+                              <p:cond delay="0"/>
+                            </p:stCondLst>
+                            <p:childTnLst>
+                              <p:par>
+                                <p:cTn id="5" presetID="1" presetClass="entr" presetSubtype="0" fill="hold" nodeType="clickEffect">
+                                  <p:stCondLst>
+                                    <p:cond delay="0"/>
+                                  </p:stCondLst>
+                                  <p:childTnLst>
+                                    <p:set>
+                                      <p:cBhvr>
+                                        <p:cTn id="6" dur="1" fill="hold">
+                                          <p:stCondLst>
+                                            <p:cond delay="0"/>
+                                          </p:stCondLst>
+                                        </p:cTn>
+                                        <p:tgtEl>
+                                          <p:spTgt spid="14"/>
+                                        </p:tgtEl>
+                                        <p:attrNameLst>
+                                          <p:attrName>style.visibility</p:attrName>
+                                        </p:attrNameLst>
+                                      </p:cBhvr>
+                                      <p:to>
+                                        <p:strVal val="visible"/>
+                                      </p:to>
+                                    </p:set>
+                                  </p:childTnLst>
+                                </p:cTn>
+                              </p:par>
+                              <p:par>
+                                <p:cTn id="7" presetID="1" presetClass="entr" presetSubtype="0" fill="hold" grpId="0" nodeType="withEffect">
+                                  <p:stCondLst>
+                                    <p:cond delay="0"/>
+                                  </p:stCondLst>
+                                  <p:childTnLst>
+                                    <p:set>
+                                      <p:cBhvr>
+                                        <p:cTn id="8" dur="1" fill="hold">
+                                          <p:stCondLst>
+                                            <p:cond delay="0"/>
+                                          </p:stCondLst>
+                                        </p:cTn>
+                                        <p:tgtEl>
+                                          <p:spTgt spid="15"/>
+                                        </p:tgtEl>
+                                        <p:attrNameLst>
+                                          <p:attrName>style.visibility</p:attrName>
+                                        </p:attrNameLst>
+                                      </p:cBhvr>
+                                      <p:to>
+                                        <p:strVal val="visible"/>
+                                      </p:to>
+                                    </p:set>
+                                  </p:childTnLst>
+                                </p:cTn>
+                              </p:par>
+                              <p:par>
+                                <p:cTn id="9" presetID="1" presetClass="entr" presetSubtype="0" fill="hold" grpId="0" nodeType="withEffect">
+                                  <p:stCondLst>
+                                    <p:cond delay="0"/>
+                                  </p:stCondLst>
+                                  <p:childTnLst>
+                                    <p:set>
+                                      <p:cBhvr>
+                                        <p:cTn id="10" dur="1" fill="hold">
+                                          <p:stCondLst>
+                                            <p:cond delay="0"/>
+                                          </p:stCondLst>
+                                        </p:cTn>
+                                        <p:tgtEl>
+                                          <p:spTgt spid="16"/>
+                                        </p:tgtEl>
+                                        <p:attrNameLst>
+                                          <p:attrName>style.visibility</p:attrName>
+                                        </p:attrNameLst>
+                                      </p:cBhvr>
+                                      <p:to>
+                                        <p:strVal val="visible"/>
+                                      </p:to>
+                                    </p:set>
+                                  </p:childTnLst>
+                                </p:cTn>
+                              </p:par>
+                            </p:childTnLst>
+                          </p:cTn>
+                        </p:par>
+                      </p:childTnLst>
+                    </p:cTn>
+                  </p:par>
+                </p:childTnLst>
+              </p:cTn>
+              <p:prevCondLst>
+                <p:cond evt="onPrev" delay="0">
+                  <p:tgtEl>
+                    <p:sldTgt/>
+                  </p:tgtEl>
+                </p:cond>
+              </p:prevCondLst>
+              <p:nextCondLst>
+                <p:cond evt="onNext" delay="0">
+                  <p:tgtEl>
+                    <p:sldTgt/>
+                  </p:tgtEl>
+                </p:cond>
+              </p:nextCondLst>
+            </p:seq>
+          </p:childTnLst>
+        </p:cTn>
       </p:par>
     </p:tnLst>
+    <p:bldLst>
+      <p:bldP spid="15" grpId="0"/>
+      <p:bldP spid="16" grpId="0"/>
+    </p:bldLst>
   </p:timing>
 </p:sld>
 </file>
@@ -17957,11 +20577,7 @@
           <a:p>
             <a:r>
               <a:rPr kumimoji="1" lang="en-US" altLang="ja-JP" dirty="0" smtClean="0"/>
-              <a:t>R package </a:t>
-            </a:r>
-            <a:r>
-              <a:rPr kumimoji="1" lang="en-US" altLang="ja-JP" dirty="0" smtClean="0"/>
-              <a:t>“</a:t>
+              <a:t>R package “</a:t>
             </a:r>
             <a:r>
               <a:rPr kumimoji="1" lang="en-US" altLang="ja-JP" dirty="0" err="1" smtClean="0"/>
@@ -18060,15 +20676,7 @@
             </a:r>
             <a:r>
               <a:rPr kumimoji="1" lang="ja-JP" altLang="en-US" dirty="0" smtClean="0"/>
-              <a:t>）</a:t>
-            </a:r>
-            <a:r>
-              <a:rPr kumimoji="1" lang="ja-JP" altLang="en-US" dirty="0" smtClean="0"/>
-              <a:t>が非常</a:t>
-            </a:r>
-            <a:r>
-              <a:rPr kumimoji="1" lang="ja-JP" altLang="en-US" dirty="0" smtClean="0"/>
-              <a:t>に分かりやすい</a:t>
+              <a:t>）が非常に分かりやすい</a:t>
             </a:r>
             <a:r>
               <a:rPr lang="en-US" altLang="ja-JP" dirty="0"/>
@@ -18968,7 +21576,270 @@
   <p:timing>
     <p:tnLst>
       <p:par>
-        <p:cTn id="1" dur="indefinite" restart="never" nodeType="tmRoot"/>
+        <p:cTn id="1" dur="indefinite" restart="never" nodeType="tmRoot">
+          <p:childTnLst>
+            <p:seq concurrent="1" nextAc="seek">
+              <p:cTn id="2" dur="indefinite" nodeType="mainSeq">
+                <p:childTnLst>
+                  <p:par>
+                    <p:cTn id="3" fill="hold">
+                      <p:stCondLst>
+                        <p:cond delay="indefinite"/>
+                      </p:stCondLst>
+                      <p:childTnLst>
+                        <p:par>
+                          <p:cTn id="4" fill="hold">
+                            <p:stCondLst>
+                              <p:cond delay="0"/>
+                            </p:stCondLst>
+                            <p:childTnLst>
+                              <p:par>
+                                <p:cTn id="5" presetID="1" presetClass="entr" presetSubtype="0" fill="hold" nodeType="clickEffect">
+                                  <p:stCondLst>
+                                    <p:cond delay="0"/>
+                                  </p:stCondLst>
+                                  <p:childTnLst>
+                                    <p:set>
+                                      <p:cBhvr>
+                                        <p:cTn id="6" dur="1" fill="hold">
+                                          <p:stCondLst>
+                                            <p:cond delay="0"/>
+                                          </p:stCondLst>
+                                        </p:cTn>
+                                        <p:tgtEl>
+                                          <p:spTgt spid="3">
+                                            <p:txEl>
+                                              <p:pRg st="6" end="6"/>
+                                            </p:txEl>
+                                          </p:spTgt>
+                                        </p:tgtEl>
+                                        <p:attrNameLst>
+                                          <p:attrName>style.visibility</p:attrName>
+                                        </p:attrNameLst>
+                                      </p:cBhvr>
+                                      <p:to>
+                                        <p:strVal val="visible"/>
+                                      </p:to>
+                                    </p:set>
+                                  </p:childTnLst>
+                                </p:cTn>
+                              </p:par>
+                              <p:par>
+                                <p:cTn id="7" presetID="1" presetClass="entr" presetSubtype="0" fill="hold" nodeType="withEffect">
+                                  <p:stCondLst>
+                                    <p:cond delay="0"/>
+                                  </p:stCondLst>
+                                  <p:childTnLst>
+                                    <p:set>
+                                      <p:cBhvr>
+                                        <p:cTn id="8" dur="1" fill="hold">
+                                          <p:stCondLst>
+                                            <p:cond delay="0"/>
+                                          </p:stCondLst>
+                                        </p:cTn>
+                                        <p:tgtEl>
+                                          <p:spTgt spid="3">
+                                            <p:txEl>
+                                              <p:pRg st="7" end="7"/>
+                                            </p:txEl>
+                                          </p:spTgt>
+                                        </p:tgtEl>
+                                        <p:attrNameLst>
+                                          <p:attrName>style.visibility</p:attrName>
+                                        </p:attrNameLst>
+                                      </p:cBhvr>
+                                      <p:to>
+                                        <p:strVal val="visible"/>
+                                      </p:to>
+                                    </p:set>
+                                  </p:childTnLst>
+                                </p:cTn>
+                              </p:par>
+                            </p:childTnLst>
+                          </p:cTn>
+                        </p:par>
+                      </p:childTnLst>
+                    </p:cTn>
+                  </p:par>
+                  <p:par>
+                    <p:cTn id="9" fill="hold">
+                      <p:stCondLst>
+                        <p:cond delay="indefinite"/>
+                      </p:stCondLst>
+                      <p:childTnLst>
+                        <p:par>
+                          <p:cTn id="10" fill="hold">
+                            <p:stCondLst>
+                              <p:cond delay="0"/>
+                            </p:stCondLst>
+                            <p:childTnLst>
+                              <p:par>
+                                <p:cTn id="11" presetID="1" presetClass="entr" presetSubtype="0" fill="hold" nodeType="clickEffect">
+                                  <p:stCondLst>
+                                    <p:cond delay="0"/>
+                                  </p:stCondLst>
+                                  <p:childTnLst>
+                                    <p:set>
+                                      <p:cBhvr>
+                                        <p:cTn id="12" dur="1" fill="hold">
+                                          <p:stCondLst>
+                                            <p:cond delay="0"/>
+                                          </p:stCondLst>
+                                        </p:cTn>
+                                        <p:tgtEl>
+                                          <p:spTgt spid="3">
+                                            <p:txEl>
+                                              <p:pRg st="8" end="8"/>
+                                            </p:txEl>
+                                          </p:spTgt>
+                                        </p:tgtEl>
+                                        <p:attrNameLst>
+                                          <p:attrName>style.visibility</p:attrName>
+                                        </p:attrNameLst>
+                                      </p:cBhvr>
+                                      <p:to>
+                                        <p:strVal val="visible"/>
+                                      </p:to>
+                                    </p:set>
+                                  </p:childTnLst>
+                                </p:cTn>
+                              </p:par>
+                              <p:par>
+                                <p:cTn id="13" presetID="1" presetClass="entr" presetSubtype="0" fill="hold" nodeType="withEffect">
+                                  <p:stCondLst>
+                                    <p:cond delay="0"/>
+                                  </p:stCondLst>
+                                  <p:childTnLst>
+                                    <p:set>
+                                      <p:cBhvr>
+                                        <p:cTn id="14" dur="1" fill="hold">
+                                          <p:stCondLst>
+                                            <p:cond delay="0"/>
+                                          </p:stCondLst>
+                                        </p:cTn>
+                                        <p:tgtEl>
+                                          <p:spTgt spid="3">
+                                            <p:txEl>
+                                              <p:pRg st="9" end="9"/>
+                                            </p:txEl>
+                                          </p:spTgt>
+                                        </p:tgtEl>
+                                        <p:attrNameLst>
+                                          <p:attrName>style.visibility</p:attrName>
+                                        </p:attrNameLst>
+                                      </p:cBhvr>
+                                      <p:to>
+                                        <p:strVal val="visible"/>
+                                      </p:to>
+                                    </p:set>
+                                  </p:childTnLst>
+                                </p:cTn>
+                              </p:par>
+                              <p:par>
+                                <p:cTn id="15" presetID="1" presetClass="entr" presetSubtype="0" fill="hold" nodeType="withEffect">
+                                  <p:stCondLst>
+                                    <p:cond delay="0"/>
+                                  </p:stCondLst>
+                                  <p:childTnLst>
+                                    <p:set>
+                                      <p:cBhvr>
+                                        <p:cTn id="16" dur="1" fill="hold">
+                                          <p:stCondLst>
+                                            <p:cond delay="0"/>
+                                          </p:stCondLst>
+                                        </p:cTn>
+                                        <p:tgtEl>
+                                          <p:spTgt spid="3">
+                                            <p:txEl>
+                                              <p:pRg st="10" end="10"/>
+                                            </p:txEl>
+                                          </p:spTgt>
+                                        </p:tgtEl>
+                                        <p:attrNameLst>
+                                          <p:attrName>style.visibility</p:attrName>
+                                        </p:attrNameLst>
+                                      </p:cBhvr>
+                                      <p:to>
+                                        <p:strVal val="visible"/>
+                                      </p:to>
+                                    </p:set>
+                                  </p:childTnLst>
+                                </p:cTn>
+                              </p:par>
+                            </p:childTnLst>
+                          </p:cTn>
+                        </p:par>
+                      </p:childTnLst>
+                    </p:cTn>
+                  </p:par>
+                  <p:par>
+                    <p:cTn id="17" fill="hold">
+                      <p:stCondLst>
+                        <p:cond delay="indefinite"/>
+                      </p:stCondLst>
+                      <p:childTnLst>
+                        <p:par>
+                          <p:cTn id="18" fill="hold">
+                            <p:stCondLst>
+                              <p:cond delay="0"/>
+                            </p:stCondLst>
+                            <p:childTnLst>
+                              <p:par>
+                                <p:cTn id="19" presetID="1" presetClass="entr" presetSubtype="0" fill="hold" nodeType="clickEffect">
+                                  <p:stCondLst>
+                                    <p:cond delay="0"/>
+                                  </p:stCondLst>
+                                  <p:childTnLst>
+                                    <p:set>
+                                      <p:cBhvr>
+                                        <p:cTn id="20" dur="1" fill="hold">
+                                          <p:stCondLst>
+                                            <p:cond delay="0"/>
+                                          </p:stCondLst>
+                                        </p:cTn>
+                                        <p:tgtEl>
+                                          <p:spTgt spid="3">
+                                            <p:txEl>
+                                              <p:pRg st="11" end="11"/>
+                                            </p:txEl>
+                                          </p:spTgt>
+                                        </p:tgtEl>
+                                        <p:attrNameLst>
+                                          <p:attrName>style.visibility</p:attrName>
+                                        </p:attrNameLst>
+                                      </p:cBhvr>
+                                      <p:to>
+                                        <p:strVal val="visible"/>
+                                      </p:to>
+                                    </p:set>
+                                  </p:childTnLst>
+                                </p:cTn>
+                              </p:par>
+                            </p:childTnLst>
+                          </p:cTn>
+                        </p:par>
+                      </p:childTnLst>
+                    </p:cTn>
+                  </p:par>
+                </p:childTnLst>
+              </p:cTn>
+              <p:prevCondLst>
+                <p:cond evt="onPrev" delay="0">
+                  <p:tgtEl>
+                    <p:sldTgt/>
+                  </p:tgtEl>
+                </p:cond>
+              </p:prevCondLst>
+              <p:nextCondLst>
+                <p:cond evt="onNext" delay="0">
+                  <p:tgtEl>
+                    <p:sldTgt/>
+                  </p:tgtEl>
+                </p:cond>
+              </p:nextCondLst>
+            </p:seq>
+          </p:childTnLst>
+        </p:cTn>
       </p:par>
     </p:tnLst>
   </p:timing>
@@ -20095,7 +22966,172 @@
   <p:timing>
     <p:tnLst>
       <p:par>
-        <p:cTn id="1" dur="indefinite" restart="never" nodeType="tmRoot"/>
+        <p:cTn id="1" dur="indefinite" restart="never" nodeType="tmRoot">
+          <p:childTnLst>
+            <p:seq concurrent="1" nextAc="seek">
+              <p:cTn id="2" dur="indefinite" nodeType="mainSeq">
+                <p:childTnLst>
+                  <p:par>
+                    <p:cTn id="3" fill="hold">
+                      <p:stCondLst>
+                        <p:cond delay="indefinite"/>
+                      </p:stCondLst>
+                      <p:childTnLst>
+                        <p:par>
+                          <p:cTn id="4" fill="hold">
+                            <p:stCondLst>
+                              <p:cond delay="0"/>
+                            </p:stCondLst>
+                            <p:childTnLst>
+                              <p:par>
+                                <p:cTn id="5" presetID="1" presetClass="entr" presetSubtype="0" fill="hold" nodeType="clickEffect">
+                                  <p:stCondLst>
+                                    <p:cond delay="0"/>
+                                  </p:stCondLst>
+                                  <p:childTnLst>
+                                    <p:set>
+                                      <p:cBhvr>
+                                        <p:cTn id="6" dur="1" fill="hold">
+                                          <p:stCondLst>
+                                            <p:cond delay="0"/>
+                                          </p:stCondLst>
+                                        </p:cTn>
+                                        <p:tgtEl>
+                                          <p:spTgt spid="3">
+                                            <p:txEl>
+                                              <p:pRg st="7" end="7"/>
+                                            </p:txEl>
+                                          </p:spTgt>
+                                        </p:tgtEl>
+                                        <p:attrNameLst>
+                                          <p:attrName>style.visibility</p:attrName>
+                                        </p:attrNameLst>
+                                      </p:cBhvr>
+                                      <p:to>
+                                        <p:strVal val="visible"/>
+                                      </p:to>
+                                    </p:set>
+                                  </p:childTnLst>
+                                </p:cTn>
+                              </p:par>
+                              <p:par>
+                                <p:cTn id="7" presetID="1" presetClass="entr" presetSubtype="0" fill="hold" nodeType="withEffect">
+                                  <p:stCondLst>
+                                    <p:cond delay="0"/>
+                                  </p:stCondLst>
+                                  <p:childTnLst>
+                                    <p:set>
+                                      <p:cBhvr>
+                                        <p:cTn id="8" dur="1" fill="hold">
+                                          <p:stCondLst>
+                                            <p:cond delay="0"/>
+                                          </p:stCondLst>
+                                        </p:cTn>
+                                        <p:tgtEl>
+                                          <p:spTgt spid="3">
+                                            <p:txEl>
+                                              <p:pRg st="8" end="8"/>
+                                            </p:txEl>
+                                          </p:spTgt>
+                                        </p:tgtEl>
+                                        <p:attrNameLst>
+                                          <p:attrName>style.visibility</p:attrName>
+                                        </p:attrNameLst>
+                                      </p:cBhvr>
+                                      <p:to>
+                                        <p:strVal val="visible"/>
+                                      </p:to>
+                                    </p:set>
+                                  </p:childTnLst>
+                                </p:cTn>
+                              </p:par>
+                              <p:par>
+                                <p:cTn id="9" presetID="1" presetClass="entr" presetSubtype="0" fill="hold" nodeType="withEffect">
+                                  <p:stCondLst>
+                                    <p:cond delay="0"/>
+                                  </p:stCondLst>
+                                  <p:childTnLst>
+                                    <p:set>
+                                      <p:cBhvr>
+                                        <p:cTn id="10" dur="1" fill="hold">
+                                          <p:stCondLst>
+                                            <p:cond delay="0"/>
+                                          </p:stCondLst>
+                                        </p:cTn>
+                                        <p:tgtEl>
+                                          <p:spTgt spid="3">
+                                            <p:txEl>
+                                              <p:pRg st="9" end="9"/>
+                                            </p:txEl>
+                                          </p:spTgt>
+                                        </p:tgtEl>
+                                        <p:attrNameLst>
+                                          <p:attrName>style.visibility</p:attrName>
+                                        </p:attrNameLst>
+                                      </p:cBhvr>
+                                      <p:to>
+                                        <p:strVal val="visible"/>
+                                      </p:to>
+                                    </p:set>
+                                  </p:childTnLst>
+                                </p:cTn>
+                              </p:par>
+                              <p:par>
+                                <p:cTn id="11" presetID="1" presetClass="entr" presetSubtype="0" fill="hold" nodeType="withEffect">
+                                  <p:stCondLst>
+                                    <p:cond delay="0"/>
+                                  </p:stCondLst>
+                                  <p:childTnLst>
+                                    <p:set>
+                                      <p:cBhvr>
+                                        <p:cTn id="12" dur="1" fill="hold">
+                                          <p:stCondLst>
+                                            <p:cond delay="0"/>
+                                          </p:stCondLst>
+                                        </p:cTn>
+                                        <p:tgtEl>
+                                          <p:spTgt spid="3">
+                                            <p:txEl>
+                                              <p:pRg st="10" end="10"/>
+                                            </p:txEl>
+                                          </p:spTgt>
+                                        </p:tgtEl>
+                                        <p:attrNameLst>
+                                          <p:attrName>style.visibility</p:attrName>
+                                        </p:attrNameLst>
+                                      </p:cBhvr>
+                                      <p:to>
+                                        <p:strVal val="visible"/>
+                                      </p:to>
+                                    </p:set>
+                                  </p:childTnLst>
+                                </p:cTn>
+                              </p:par>
+                            </p:childTnLst>
+                          </p:cTn>
+                        </p:par>
+                      </p:childTnLst>
+                    </p:cTn>
+                  </p:par>
+                </p:childTnLst>
+              </p:cTn>
+              <p:prevCondLst>
+                <p:cond evt="onPrev" delay="0">
+                  <p:tgtEl>
+                    <p:sldTgt/>
+                  </p:tgtEl>
+                </p:cond>
+              </p:prevCondLst>
+              <p:nextCondLst>
+                <p:cond evt="onNext" delay="0">
+                  <p:tgtEl>
+                    <p:sldTgt/>
+                  </p:tgtEl>
+                </p:cond>
+              </p:nextCondLst>
+            </p:seq>
+          </p:childTnLst>
+        </p:cTn>
       </p:par>
     </p:tnLst>
   </p:timing>
@@ -20306,7 +23342,7 @@
             </a:r>
             <a:r>
               <a:rPr lang="en-US" altLang="ja-JP" sz="1200" dirty="0" smtClean="0"/>
-              <a:t>(DOSE &lt;= 500)</a:t>
+              <a:t>(DOSE &gt;= 500)</a:t>
             </a:r>
           </a:p>
           <a:p>
@@ -20373,11 +23409,11 @@
             </a:r>
             <a:r>
               <a:rPr lang="en-US" altLang="ja-JP" sz="1200" dirty="0"/>
-              <a:t>(DOSE &lt;= </a:t>
+              <a:t>(DOSE </a:t>
             </a:r>
             <a:r>
               <a:rPr lang="en-US" altLang="ja-JP" sz="1200" dirty="0" smtClean="0"/>
-              <a:t>500 &amp; RACE == 1)</a:t>
+              <a:t>&gt;= 500 &amp; RACE == 1)</a:t>
             </a:r>
             <a:endParaRPr lang="en-US" altLang="ja-JP" sz="1200" dirty="0"/>
           </a:p>
@@ -21228,7 +24264,7 @@
                   <a:schemeClr val="tx1"/>
                 </a:solidFill>
               </a:rPr>
-              <a:t>DOSE &lt;= </a:t>
+              <a:t>DOSE </a:t>
             </a:r>
             <a:r>
               <a:rPr lang="en-US" altLang="ja-JP" sz="1000" dirty="0" smtClean="0">
@@ -21236,7 +24272,7 @@
                   <a:schemeClr val="tx1"/>
                 </a:solidFill>
               </a:rPr>
-              <a:t>500)</a:t>
+              <a:t>&gt;= 500)</a:t>
             </a:r>
             <a:endParaRPr kumimoji="1" lang="ja-JP" altLang="en-US" sz="1000" dirty="0">
               <a:solidFill>
@@ -23047,9 +26083,565 @@
   <p:timing>
     <p:tnLst>
       <p:par>
-        <p:cTn id="1" dur="indefinite" restart="never" nodeType="tmRoot"/>
+        <p:cTn id="1" dur="indefinite" restart="never" nodeType="tmRoot">
+          <p:childTnLst>
+            <p:seq concurrent="1" nextAc="seek">
+              <p:cTn id="2" dur="indefinite" nodeType="mainSeq">
+                <p:childTnLst>
+                  <p:par>
+                    <p:cTn id="3" fill="hold">
+                      <p:stCondLst>
+                        <p:cond delay="indefinite"/>
+                      </p:stCondLst>
+                      <p:childTnLst>
+                        <p:par>
+                          <p:cTn id="4" fill="hold">
+                            <p:stCondLst>
+                              <p:cond delay="0"/>
+                            </p:stCondLst>
+                            <p:childTnLst>
+                              <p:par>
+                                <p:cTn id="5" presetID="1" presetClass="entr" presetSubtype="0" fill="hold" grpId="0" nodeType="clickEffect">
+                                  <p:stCondLst>
+                                    <p:cond delay="0"/>
+                                  </p:stCondLst>
+                                  <p:childTnLst>
+                                    <p:set>
+                                      <p:cBhvr>
+                                        <p:cTn id="6" dur="1" fill="hold">
+                                          <p:stCondLst>
+                                            <p:cond delay="0"/>
+                                          </p:stCondLst>
+                                        </p:cTn>
+                                        <p:tgtEl>
+                                          <p:spTgt spid="10"/>
+                                        </p:tgtEl>
+                                        <p:attrNameLst>
+                                          <p:attrName>style.visibility</p:attrName>
+                                        </p:attrNameLst>
+                                      </p:cBhvr>
+                                      <p:to>
+                                        <p:strVal val="visible"/>
+                                      </p:to>
+                                    </p:set>
+                                  </p:childTnLst>
+                                </p:cTn>
+                              </p:par>
+                            </p:childTnLst>
+                          </p:cTn>
+                        </p:par>
+                      </p:childTnLst>
+                    </p:cTn>
+                  </p:par>
+                  <p:par>
+                    <p:cTn id="7" fill="hold">
+                      <p:stCondLst>
+                        <p:cond delay="indefinite"/>
+                      </p:stCondLst>
+                      <p:childTnLst>
+                        <p:par>
+                          <p:cTn id="8" fill="hold">
+                            <p:stCondLst>
+                              <p:cond delay="0"/>
+                            </p:stCondLst>
+                            <p:childTnLst>
+                              <p:par>
+                                <p:cTn id="9" presetID="1" presetClass="entr" presetSubtype="0" fill="hold" nodeType="clickEffect">
+                                  <p:stCondLst>
+                                    <p:cond delay="0"/>
+                                  </p:stCondLst>
+                                  <p:childTnLst>
+                                    <p:set>
+                                      <p:cBhvr>
+                                        <p:cTn id="10" dur="1" fill="hold">
+                                          <p:stCondLst>
+                                            <p:cond delay="0"/>
+                                          </p:stCondLst>
+                                        </p:cTn>
+                                        <p:tgtEl>
+                                          <p:spTgt spid="3">
+                                            <p:txEl>
+                                              <p:pRg st="9" end="9"/>
+                                            </p:txEl>
+                                          </p:spTgt>
+                                        </p:tgtEl>
+                                        <p:attrNameLst>
+                                          <p:attrName>style.visibility</p:attrName>
+                                        </p:attrNameLst>
+                                      </p:cBhvr>
+                                      <p:to>
+                                        <p:strVal val="visible"/>
+                                      </p:to>
+                                    </p:set>
+                                  </p:childTnLst>
+                                </p:cTn>
+                              </p:par>
+                              <p:par>
+                                <p:cTn id="11" presetID="1" presetClass="entr" presetSubtype="0" fill="hold" nodeType="withEffect">
+                                  <p:stCondLst>
+                                    <p:cond delay="0"/>
+                                  </p:stCondLst>
+                                  <p:childTnLst>
+                                    <p:set>
+                                      <p:cBhvr>
+                                        <p:cTn id="12" dur="1" fill="hold">
+                                          <p:stCondLst>
+                                            <p:cond delay="0"/>
+                                          </p:stCondLst>
+                                        </p:cTn>
+                                        <p:tgtEl>
+                                          <p:spTgt spid="3">
+                                            <p:txEl>
+                                              <p:pRg st="10" end="10"/>
+                                            </p:txEl>
+                                          </p:spTgt>
+                                        </p:tgtEl>
+                                        <p:attrNameLst>
+                                          <p:attrName>style.visibility</p:attrName>
+                                        </p:attrNameLst>
+                                      </p:cBhvr>
+                                      <p:to>
+                                        <p:strVal val="visible"/>
+                                      </p:to>
+                                    </p:set>
+                                  </p:childTnLst>
+                                </p:cTn>
+                              </p:par>
+                              <p:par>
+                                <p:cTn id="13" presetID="1" presetClass="entr" presetSubtype="0" fill="hold" nodeType="withEffect">
+                                  <p:stCondLst>
+                                    <p:cond delay="0"/>
+                                  </p:stCondLst>
+                                  <p:childTnLst>
+                                    <p:set>
+                                      <p:cBhvr>
+                                        <p:cTn id="14" dur="1" fill="hold">
+                                          <p:stCondLst>
+                                            <p:cond delay="0"/>
+                                          </p:stCondLst>
+                                        </p:cTn>
+                                        <p:tgtEl>
+                                          <p:spTgt spid="3">
+                                            <p:txEl>
+                                              <p:pRg st="11" end="11"/>
+                                            </p:txEl>
+                                          </p:spTgt>
+                                        </p:tgtEl>
+                                        <p:attrNameLst>
+                                          <p:attrName>style.visibility</p:attrName>
+                                        </p:attrNameLst>
+                                      </p:cBhvr>
+                                      <p:to>
+                                        <p:strVal val="visible"/>
+                                      </p:to>
+                                    </p:set>
+                                  </p:childTnLst>
+                                </p:cTn>
+                              </p:par>
+                              <p:par>
+                                <p:cTn id="15" presetID="1" presetClass="entr" presetSubtype="0" fill="hold" nodeType="withEffect">
+                                  <p:stCondLst>
+                                    <p:cond delay="0"/>
+                                  </p:stCondLst>
+                                  <p:childTnLst>
+                                    <p:set>
+                                      <p:cBhvr>
+                                        <p:cTn id="16" dur="1" fill="hold">
+                                          <p:stCondLst>
+                                            <p:cond delay="0"/>
+                                          </p:stCondLst>
+                                        </p:cTn>
+                                        <p:tgtEl>
+                                          <p:spTgt spid="3">
+                                            <p:txEl>
+                                              <p:pRg st="12" end="12"/>
+                                            </p:txEl>
+                                          </p:spTgt>
+                                        </p:tgtEl>
+                                        <p:attrNameLst>
+                                          <p:attrName>style.visibility</p:attrName>
+                                        </p:attrNameLst>
+                                      </p:cBhvr>
+                                      <p:to>
+                                        <p:strVal val="visible"/>
+                                      </p:to>
+                                    </p:set>
+                                  </p:childTnLst>
+                                </p:cTn>
+                              </p:par>
+                              <p:par>
+                                <p:cTn id="17" presetID="1" presetClass="entr" presetSubtype="0" fill="hold" nodeType="withEffect">
+                                  <p:stCondLst>
+                                    <p:cond delay="0"/>
+                                  </p:stCondLst>
+                                  <p:childTnLst>
+                                    <p:set>
+                                      <p:cBhvr>
+                                        <p:cTn id="18" dur="1" fill="hold">
+                                          <p:stCondLst>
+                                            <p:cond delay="0"/>
+                                          </p:stCondLst>
+                                        </p:cTn>
+                                        <p:tgtEl>
+                                          <p:spTgt spid="3">
+                                            <p:txEl>
+                                              <p:pRg st="13" end="13"/>
+                                            </p:txEl>
+                                          </p:spTgt>
+                                        </p:tgtEl>
+                                        <p:attrNameLst>
+                                          <p:attrName>style.visibility</p:attrName>
+                                        </p:attrNameLst>
+                                      </p:cBhvr>
+                                      <p:to>
+                                        <p:strVal val="visible"/>
+                                      </p:to>
+                                    </p:set>
+                                  </p:childTnLst>
+                                </p:cTn>
+                              </p:par>
+                              <p:par>
+                                <p:cTn id="19" presetID="1" presetClass="entr" presetSubtype="0" fill="hold" nodeType="withEffect">
+                                  <p:stCondLst>
+                                    <p:cond delay="0"/>
+                                  </p:stCondLst>
+                                  <p:childTnLst>
+                                    <p:set>
+                                      <p:cBhvr>
+                                        <p:cTn id="20" dur="1" fill="hold">
+                                          <p:stCondLst>
+                                            <p:cond delay="0"/>
+                                          </p:stCondLst>
+                                        </p:cTn>
+                                        <p:tgtEl>
+                                          <p:spTgt spid="3">
+                                            <p:txEl>
+                                              <p:pRg st="14" end="14"/>
+                                            </p:txEl>
+                                          </p:spTgt>
+                                        </p:tgtEl>
+                                        <p:attrNameLst>
+                                          <p:attrName>style.visibility</p:attrName>
+                                        </p:attrNameLst>
+                                      </p:cBhvr>
+                                      <p:to>
+                                        <p:strVal val="visible"/>
+                                      </p:to>
+                                    </p:set>
+                                  </p:childTnLst>
+                                </p:cTn>
+                              </p:par>
+                              <p:par>
+                                <p:cTn id="21" presetID="1" presetClass="entr" presetSubtype="0" fill="hold" nodeType="withEffect">
+                                  <p:stCondLst>
+                                    <p:cond delay="0"/>
+                                  </p:stCondLst>
+                                  <p:childTnLst>
+                                    <p:set>
+                                      <p:cBhvr>
+                                        <p:cTn id="22" dur="1" fill="hold">
+                                          <p:stCondLst>
+                                            <p:cond delay="0"/>
+                                          </p:stCondLst>
+                                        </p:cTn>
+                                        <p:tgtEl>
+                                          <p:spTgt spid="3">
+                                            <p:txEl>
+                                              <p:pRg st="15" end="15"/>
+                                            </p:txEl>
+                                          </p:spTgt>
+                                        </p:tgtEl>
+                                        <p:attrNameLst>
+                                          <p:attrName>style.visibility</p:attrName>
+                                        </p:attrNameLst>
+                                      </p:cBhvr>
+                                      <p:to>
+                                        <p:strVal val="visible"/>
+                                      </p:to>
+                                    </p:set>
+                                  </p:childTnLst>
+                                </p:cTn>
+                              </p:par>
+                              <p:par>
+                                <p:cTn id="23" presetID="1" presetClass="entr" presetSubtype="0" fill="hold" nodeType="withEffect">
+                                  <p:stCondLst>
+                                    <p:cond delay="0"/>
+                                  </p:stCondLst>
+                                  <p:childTnLst>
+                                    <p:set>
+                                      <p:cBhvr>
+                                        <p:cTn id="24" dur="1" fill="hold">
+                                          <p:stCondLst>
+                                            <p:cond delay="0"/>
+                                          </p:stCondLst>
+                                        </p:cTn>
+                                        <p:tgtEl>
+                                          <p:spTgt spid="3">
+                                            <p:txEl>
+                                              <p:pRg st="16" end="16"/>
+                                            </p:txEl>
+                                          </p:spTgt>
+                                        </p:tgtEl>
+                                        <p:attrNameLst>
+                                          <p:attrName>style.visibility</p:attrName>
+                                        </p:attrNameLst>
+                                      </p:cBhvr>
+                                      <p:to>
+                                        <p:strVal val="visible"/>
+                                      </p:to>
+                                    </p:set>
+                                  </p:childTnLst>
+                                </p:cTn>
+                              </p:par>
+                            </p:childTnLst>
+                          </p:cTn>
+                        </p:par>
+                      </p:childTnLst>
+                    </p:cTn>
+                  </p:par>
+                  <p:par>
+                    <p:cTn id="25" fill="hold">
+                      <p:stCondLst>
+                        <p:cond delay="indefinite"/>
+                      </p:stCondLst>
+                      <p:childTnLst>
+                        <p:par>
+                          <p:cTn id="26" fill="hold">
+                            <p:stCondLst>
+                              <p:cond delay="0"/>
+                            </p:stCondLst>
+                            <p:childTnLst>
+                              <p:par>
+                                <p:cTn id="27" presetID="1" presetClass="entr" presetSubtype="0" fill="hold" nodeType="clickEffect">
+                                  <p:stCondLst>
+                                    <p:cond delay="0"/>
+                                  </p:stCondLst>
+                                  <p:childTnLst>
+                                    <p:set>
+                                      <p:cBhvr>
+                                        <p:cTn id="28" dur="1" fill="hold">
+                                          <p:stCondLst>
+                                            <p:cond delay="0"/>
+                                          </p:stCondLst>
+                                        </p:cTn>
+                                        <p:tgtEl>
+                                          <p:spTgt spid="21"/>
+                                        </p:tgtEl>
+                                        <p:attrNameLst>
+                                          <p:attrName>style.visibility</p:attrName>
+                                        </p:attrNameLst>
+                                      </p:cBhvr>
+                                      <p:to>
+                                        <p:strVal val="visible"/>
+                                      </p:to>
+                                    </p:set>
+                                  </p:childTnLst>
+                                </p:cTn>
+                              </p:par>
+                              <p:par>
+                                <p:cTn id="29" presetID="1" presetClass="entr" presetSubtype="0" fill="hold" grpId="0" nodeType="withEffect">
+                                  <p:stCondLst>
+                                    <p:cond delay="0"/>
+                                  </p:stCondLst>
+                                  <p:childTnLst>
+                                    <p:set>
+                                      <p:cBhvr>
+                                        <p:cTn id="30" dur="1" fill="hold">
+                                          <p:stCondLst>
+                                            <p:cond delay="0"/>
+                                          </p:stCondLst>
+                                        </p:cTn>
+                                        <p:tgtEl>
+                                          <p:spTgt spid="22"/>
+                                        </p:tgtEl>
+                                        <p:attrNameLst>
+                                          <p:attrName>style.visibility</p:attrName>
+                                        </p:attrNameLst>
+                                      </p:cBhvr>
+                                      <p:to>
+                                        <p:strVal val="visible"/>
+                                      </p:to>
+                                    </p:set>
+                                  </p:childTnLst>
+                                </p:cTn>
+                              </p:par>
+                              <p:par>
+                                <p:cTn id="31" presetID="1" presetClass="entr" presetSubtype="0" fill="hold" nodeType="withEffect">
+                                  <p:stCondLst>
+                                    <p:cond delay="0"/>
+                                  </p:stCondLst>
+                                  <p:childTnLst>
+                                    <p:set>
+                                      <p:cBhvr>
+                                        <p:cTn id="32" dur="1" fill="hold">
+                                          <p:stCondLst>
+                                            <p:cond delay="0"/>
+                                          </p:stCondLst>
+                                        </p:cTn>
+                                        <p:tgtEl>
+                                          <p:spTgt spid="23"/>
+                                        </p:tgtEl>
+                                        <p:attrNameLst>
+                                          <p:attrName>style.visibility</p:attrName>
+                                        </p:attrNameLst>
+                                      </p:cBhvr>
+                                      <p:to>
+                                        <p:strVal val="visible"/>
+                                      </p:to>
+                                    </p:set>
+                                  </p:childTnLst>
+                                </p:cTn>
+                              </p:par>
+                            </p:childTnLst>
+                          </p:cTn>
+                        </p:par>
+                      </p:childTnLst>
+                    </p:cTn>
+                  </p:par>
+                  <p:par>
+                    <p:cTn id="33" fill="hold">
+                      <p:stCondLst>
+                        <p:cond delay="indefinite"/>
+                      </p:stCondLst>
+                      <p:childTnLst>
+                        <p:par>
+                          <p:cTn id="34" fill="hold">
+                            <p:stCondLst>
+                              <p:cond delay="0"/>
+                            </p:stCondLst>
+                            <p:childTnLst>
+                              <p:par>
+                                <p:cTn id="35" presetID="1" presetClass="entr" presetSubtype="0" fill="hold" grpId="0" nodeType="clickEffect">
+                                  <p:stCondLst>
+                                    <p:cond delay="0"/>
+                                  </p:stCondLst>
+                                  <p:childTnLst>
+                                    <p:set>
+                                      <p:cBhvr>
+                                        <p:cTn id="36" dur="1" fill="hold">
+                                          <p:stCondLst>
+                                            <p:cond delay="0"/>
+                                          </p:stCondLst>
+                                        </p:cTn>
+                                        <p:tgtEl>
+                                          <p:spTgt spid="24"/>
+                                        </p:tgtEl>
+                                        <p:attrNameLst>
+                                          <p:attrName>style.visibility</p:attrName>
+                                        </p:attrNameLst>
+                                      </p:cBhvr>
+                                      <p:to>
+                                        <p:strVal val="visible"/>
+                                      </p:to>
+                                    </p:set>
+                                  </p:childTnLst>
+                                </p:cTn>
+                              </p:par>
+                              <p:par>
+                                <p:cTn id="37" presetID="1" presetClass="entr" presetSubtype="0" fill="hold" nodeType="withEffect">
+                                  <p:stCondLst>
+                                    <p:cond delay="0"/>
+                                  </p:stCondLst>
+                                  <p:childTnLst>
+                                    <p:set>
+                                      <p:cBhvr>
+                                        <p:cTn id="38" dur="1" fill="hold">
+                                          <p:stCondLst>
+                                            <p:cond delay="0"/>
+                                          </p:stCondLst>
+                                        </p:cTn>
+                                        <p:tgtEl>
+                                          <p:spTgt spid="25"/>
+                                        </p:tgtEl>
+                                        <p:attrNameLst>
+                                          <p:attrName>style.visibility</p:attrName>
+                                        </p:attrNameLst>
+                                      </p:cBhvr>
+                                      <p:to>
+                                        <p:strVal val="visible"/>
+                                      </p:to>
+                                    </p:set>
+                                  </p:childTnLst>
+                                </p:cTn>
+                              </p:par>
+                            </p:childTnLst>
+                          </p:cTn>
+                        </p:par>
+                      </p:childTnLst>
+                    </p:cTn>
+                  </p:par>
+                  <p:par>
+                    <p:cTn id="39" fill="hold">
+                      <p:stCondLst>
+                        <p:cond delay="indefinite"/>
+                      </p:stCondLst>
+                      <p:childTnLst>
+                        <p:par>
+                          <p:cTn id="40" fill="hold">
+                            <p:stCondLst>
+                              <p:cond delay="0"/>
+                            </p:stCondLst>
+                            <p:childTnLst>
+                              <p:par>
+                                <p:cTn id="41" presetID="1" presetClass="entr" presetSubtype="0" fill="hold" grpId="0" nodeType="clickEffect">
+                                  <p:stCondLst>
+                                    <p:cond delay="0"/>
+                                  </p:stCondLst>
+                                  <p:childTnLst>
+                                    <p:set>
+                                      <p:cBhvr>
+                                        <p:cTn id="42" dur="1" fill="hold">
+                                          <p:stCondLst>
+                                            <p:cond delay="0"/>
+                                          </p:stCondLst>
+                                        </p:cTn>
+                                        <p:tgtEl>
+                                          <p:spTgt spid="26"/>
+                                        </p:tgtEl>
+                                        <p:attrNameLst>
+                                          <p:attrName>style.visibility</p:attrName>
+                                        </p:attrNameLst>
+                                      </p:cBhvr>
+                                      <p:to>
+                                        <p:strVal val="visible"/>
+                                      </p:to>
+                                    </p:set>
+                                  </p:childTnLst>
+                                </p:cTn>
+                              </p:par>
+                            </p:childTnLst>
+                          </p:cTn>
+                        </p:par>
+                      </p:childTnLst>
+                    </p:cTn>
+                  </p:par>
+                </p:childTnLst>
+              </p:cTn>
+              <p:prevCondLst>
+                <p:cond evt="onPrev" delay="0">
+                  <p:tgtEl>
+                    <p:sldTgt/>
+                  </p:tgtEl>
+                </p:cond>
+              </p:prevCondLst>
+              <p:nextCondLst>
+                <p:cond evt="onNext" delay="0">
+                  <p:tgtEl>
+                    <p:sldTgt/>
+                  </p:tgtEl>
+                </p:cond>
+              </p:nextCondLst>
+            </p:seq>
+          </p:childTnLst>
+        </p:cTn>
       </p:par>
     </p:tnLst>
+    <p:bldLst>
+      <p:bldP spid="10" grpId="0" animBg="1"/>
+      <p:bldP spid="22" grpId="0" animBg="1"/>
+      <p:bldP spid="24" grpId="0" animBg="1"/>
+      <p:bldP spid="26" grpId="0" animBg="1"/>
+    </p:bldLst>
   </p:timing>
 </p:sld>
 </file>
@@ -23184,11 +26776,7 @@
             </a:r>
             <a:r>
               <a:rPr lang="ja-JP" altLang="en-US" dirty="0" smtClean="0"/>
-              <a:t>）ごとの</a:t>
-            </a:r>
-            <a:r>
-              <a:rPr lang="ja-JP" altLang="en-US" dirty="0" smtClean="0"/>
-              <a:t>被験者数</a:t>
+              <a:t>）ごとの被験者数</a:t>
             </a:r>
             <a:r>
               <a:rPr lang="en-US" altLang="ja-JP" dirty="0" smtClean="0"/>
@@ -23214,11 +26802,7 @@
             </a:r>
             <a:r>
               <a:rPr lang="en-US" altLang="ja-JP" dirty="0" smtClean="0"/>
-              <a:t>MK7655(DRUG=2</a:t>
-            </a:r>
-            <a:r>
-              <a:rPr lang="en-US" altLang="ja-JP" dirty="0" smtClean="0"/>
-              <a:t>)</a:t>
+              <a:t>MK7655(DRUG=2)</a:t>
             </a:r>
             <a:r>
               <a:rPr lang="ja-JP" altLang="en-US" dirty="0" smtClean="0"/>
@@ -23230,11 +26814,7 @@
             </a:r>
             <a:r>
               <a:rPr lang="ja-JP" altLang="en-US" dirty="0" smtClean="0"/>
-              <a:t>の行数</a:t>
-            </a:r>
-            <a:r>
-              <a:rPr lang="ja-JP" altLang="en-US" dirty="0" smtClean="0"/>
-              <a:t>）</a:t>
+              <a:t>の行数）</a:t>
             </a:r>
             <a:endParaRPr lang="en-US" altLang="ja-JP" dirty="0" smtClean="0"/>
           </a:p>

</xml_diff>